<commit_message>
Adding Automation Tool Code for Back-up
</commit_message>
<xml_diff>
--- a/revised-ppts/Day 14 PPT.pptx
+++ b/revised-ppts/Day 14 PPT.pptx
@@ -389,6 +389,682 @@
 
 <file path=ppt/changesInfos/changesInfo1.xml><?xml version="1.0" encoding="utf-8"?>
 <pc:chgInfo xmlns:a="http://schemas.openxmlformats.org/drawingml/2006/main" xmlns:r="http://schemas.openxmlformats.org/officeDocument/2006/relationships" xmlns:ac="http://schemas.microsoft.com/office/drawing/2013/main/command" xmlns:pc="http://schemas.microsoft.com/office/powerpoint/2013/main/command">
+  <pc:docChgLst>
+    <pc:chgData name="Cynthia Enciso" userId="7915927f-c5cf-4e1f-876d-e79882ad52fa" providerId="ADAL" clId="{ED60EBD3-90AC-49DF-9FC1-4EEE9F91A7A4}"/>
+    <pc:docChg chg="undo redo custSel addSld delSld modSld">
+      <pc:chgData name="Cynthia Enciso" userId="7915927f-c5cf-4e1f-876d-e79882ad52fa" providerId="ADAL" clId="{ED60EBD3-90AC-49DF-9FC1-4EEE9F91A7A4}" dt="2021-05-11T21:22:14.441" v="803" actId="20577"/>
+      <pc:docMkLst>
+        <pc:docMk/>
+      </pc:docMkLst>
+      <pc:sldChg chg="addSp delSp modSp mod">
+        <pc:chgData name="Cynthia Enciso" userId="7915927f-c5cf-4e1f-876d-e79882ad52fa" providerId="ADAL" clId="{ED60EBD3-90AC-49DF-9FC1-4EEE9F91A7A4}" dt="2021-05-11T21:15:41.825" v="799" actId="478"/>
+        <pc:sldMkLst>
+          <pc:docMk/>
+          <pc:sldMk cId="0" sldId="257"/>
+        </pc:sldMkLst>
+        <pc:spChg chg="add del mod">
+          <ac:chgData name="Cynthia Enciso" userId="7915927f-c5cf-4e1f-876d-e79882ad52fa" providerId="ADAL" clId="{ED60EBD3-90AC-49DF-9FC1-4EEE9F91A7A4}" dt="2021-05-11T21:15:41.825" v="799" actId="478"/>
+          <ac:spMkLst>
+            <pc:docMk/>
+            <pc:sldMk cId="0" sldId="257"/>
+            <ac:spMk id="2" creationId="{61F721CD-1E39-4ABA-BF97-A494BA22AA33}"/>
+          </ac:spMkLst>
+        </pc:spChg>
+      </pc:sldChg>
+      <pc:sldChg chg="modSp mod">
+        <pc:chgData name="Cynthia Enciso" userId="7915927f-c5cf-4e1f-876d-e79882ad52fa" providerId="ADAL" clId="{ED60EBD3-90AC-49DF-9FC1-4EEE9F91A7A4}" dt="2021-05-11T14:33:13.540" v="492" actId="14100"/>
+        <pc:sldMkLst>
+          <pc:docMk/>
+          <pc:sldMk cId="0" sldId="258"/>
+        </pc:sldMkLst>
+        <pc:spChg chg="mod">
+          <ac:chgData name="Cynthia Enciso" userId="7915927f-c5cf-4e1f-876d-e79882ad52fa" providerId="ADAL" clId="{ED60EBD3-90AC-49DF-9FC1-4EEE9F91A7A4}" dt="2021-05-11T14:33:13.540" v="492" actId="14100"/>
+          <ac:spMkLst>
+            <pc:docMk/>
+            <pc:sldMk cId="0" sldId="258"/>
+            <ac:spMk id="226" creationId="{00000000-0000-0000-0000-000000000000}"/>
+          </ac:spMkLst>
+        </pc:spChg>
+      </pc:sldChg>
+      <pc:sldChg chg="addSp modSp mod">
+        <pc:chgData name="Cynthia Enciso" userId="7915927f-c5cf-4e1f-876d-e79882ad52fa" providerId="ADAL" clId="{ED60EBD3-90AC-49DF-9FC1-4EEE9F91A7A4}" dt="2021-05-11T15:27:37.610" v="653" actId="14100"/>
+        <pc:sldMkLst>
+          <pc:docMk/>
+          <pc:sldMk cId="0" sldId="259"/>
+        </pc:sldMkLst>
+        <pc:spChg chg="add mod">
+          <ac:chgData name="Cynthia Enciso" userId="7915927f-c5cf-4e1f-876d-e79882ad52fa" providerId="ADAL" clId="{ED60EBD3-90AC-49DF-9FC1-4EEE9F91A7A4}" dt="2021-05-11T15:27:37.610" v="653" actId="14100"/>
+          <ac:spMkLst>
+            <pc:docMk/>
+            <pc:sldMk cId="0" sldId="259"/>
+            <ac:spMk id="5" creationId="{EC29FA11-EBC8-4E68-A3F5-10B28AAD6865}"/>
+          </ac:spMkLst>
+        </pc:spChg>
+      </pc:sldChg>
+      <pc:sldChg chg="del">
+        <pc:chgData name="Cynthia Enciso" userId="7915927f-c5cf-4e1f-876d-e79882ad52fa" providerId="ADAL" clId="{ED60EBD3-90AC-49DF-9FC1-4EEE9F91A7A4}" dt="2021-05-11T17:05:22.002" v="654" actId="47"/>
+        <pc:sldMkLst>
+          <pc:docMk/>
+          <pc:sldMk cId="0" sldId="264"/>
+        </pc:sldMkLst>
+      </pc:sldChg>
+      <pc:sldChg chg="modSp mod">
+        <pc:chgData name="Cynthia Enciso" userId="7915927f-c5cf-4e1f-876d-e79882ad52fa" providerId="ADAL" clId="{ED60EBD3-90AC-49DF-9FC1-4EEE9F91A7A4}" dt="2021-05-11T17:20:41.685" v="775" actId="14100"/>
+        <pc:sldMkLst>
+          <pc:docMk/>
+          <pc:sldMk cId="0" sldId="266"/>
+        </pc:sldMkLst>
+        <pc:spChg chg="mod">
+          <ac:chgData name="Cynthia Enciso" userId="7915927f-c5cf-4e1f-876d-e79882ad52fa" providerId="ADAL" clId="{ED60EBD3-90AC-49DF-9FC1-4EEE9F91A7A4}" dt="2021-05-11T17:20:41.685" v="775" actId="14100"/>
+          <ac:spMkLst>
+            <pc:docMk/>
+            <pc:sldMk cId="0" sldId="266"/>
+            <ac:spMk id="3" creationId="{B191859A-9A4C-4DDF-89BD-47134E6C4842}"/>
+          </ac:spMkLst>
+        </pc:spChg>
+      </pc:sldChg>
+      <pc:sldChg chg="modSp mod">
+        <pc:chgData name="Cynthia Enciso" userId="7915927f-c5cf-4e1f-876d-e79882ad52fa" providerId="ADAL" clId="{ED60EBD3-90AC-49DF-9FC1-4EEE9F91A7A4}" dt="2021-05-11T17:12:57.940" v="773" actId="20577"/>
+        <pc:sldMkLst>
+          <pc:docMk/>
+          <pc:sldMk cId="2546056288" sldId="274"/>
+        </pc:sldMkLst>
+        <pc:spChg chg="mod">
+          <ac:chgData name="Cynthia Enciso" userId="7915927f-c5cf-4e1f-876d-e79882ad52fa" providerId="ADAL" clId="{ED60EBD3-90AC-49DF-9FC1-4EEE9F91A7A4}" dt="2021-05-11T17:12:57.940" v="773" actId="20577"/>
+          <ac:spMkLst>
+            <pc:docMk/>
+            <pc:sldMk cId="2546056288" sldId="274"/>
+            <ac:spMk id="9" creationId="{8DCC4198-E08D-4604-B165-0E6553F9902B}"/>
+          </ac:spMkLst>
+        </pc:spChg>
+      </pc:sldChg>
+      <pc:sldChg chg="addSp delSp modSp new mod">
+        <pc:chgData name="Cynthia Enciso" userId="7915927f-c5cf-4e1f-876d-e79882ad52fa" providerId="ADAL" clId="{ED60EBD3-90AC-49DF-9FC1-4EEE9F91A7A4}" dt="2021-05-11T14:31:19.088" v="416" actId="1076"/>
+        <pc:sldMkLst>
+          <pc:docMk/>
+          <pc:sldMk cId="111416777" sldId="278"/>
+        </pc:sldMkLst>
+        <pc:spChg chg="del">
+          <ac:chgData name="Cynthia Enciso" userId="7915927f-c5cf-4e1f-876d-e79882ad52fa" providerId="ADAL" clId="{ED60EBD3-90AC-49DF-9FC1-4EEE9F91A7A4}" dt="2021-05-11T14:08:07.417" v="1" actId="478"/>
+          <ac:spMkLst>
+            <pc:docMk/>
+            <pc:sldMk cId="111416777" sldId="278"/>
+            <ac:spMk id="3" creationId="{A1D32090-8B52-4D3C-AEAB-B83F39FD2F0A}"/>
+          </ac:spMkLst>
+        </pc:spChg>
+        <pc:spChg chg="add mod">
+          <ac:chgData name="Cynthia Enciso" userId="7915927f-c5cf-4e1f-876d-e79882ad52fa" providerId="ADAL" clId="{ED60EBD3-90AC-49DF-9FC1-4EEE9F91A7A4}" dt="2021-05-11T14:08:13.696" v="3" actId="13822"/>
+          <ac:spMkLst>
+            <pc:docMk/>
+            <pc:sldMk cId="111416777" sldId="278"/>
+            <ac:spMk id="5" creationId="{F2A760AB-011A-4307-95B1-956C56F2E5C9}"/>
+          </ac:spMkLst>
+        </pc:spChg>
+        <pc:spChg chg="add mod">
+          <ac:chgData name="Cynthia Enciso" userId="7915927f-c5cf-4e1f-876d-e79882ad52fa" providerId="ADAL" clId="{ED60EBD3-90AC-49DF-9FC1-4EEE9F91A7A4}" dt="2021-05-11T14:08:23.688" v="9" actId="1076"/>
+          <ac:spMkLst>
+            <pc:docMk/>
+            <pc:sldMk cId="111416777" sldId="278"/>
+            <ac:spMk id="6" creationId="{6CC213E8-A3E0-45A2-B971-6D3F9624E54E}"/>
+          </ac:spMkLst>
+        </pc:spChg>
+        <pc:spChg chg="add mod">
+          <ac:chgData name="Cynthia Enciso" userId="7915927f-c5cf-4e1f-876d-e79882ad52fa" providerId="ADAL" clId="{ED60EBD3-90AC-49DF-9FC1-4EEE9F91A7A4}" dt="2021-05-11T14:08:30.776" v="13" actId="1076"/>
+          <ac:spMkLst>
+            <pc:docMk/>
+            <pc:sldMk cId="111416777" sldId="278"/>
+            <ac:spMk id="7" creationId="{FEFE4E76-5193-4E48-B4AF-545C0F6EE91C}"/>
+          </ac:spMkLst>
+        </pc:spChg>
+        <pc:spChg chg="add mod">
+          <ac:chgData name="Cynthia Enciso" userId="7915927f-c5cf-4e1f-876d-e79882ad52fa" providerId="ADAL" clId="{ED60EBD3-90AC-49DF-9FC1-4EEE9F91A7A4}" dt="2021-05-11T14:08:40.744" v="28" actId="20577"/>
+          <ac:spMkLst>
+            <pc:docMk/>
+            <pc:sldMk cId="111416777" sldId="278"/>
+            <ac:spMk id="8" creationId="{77F69B0E-E074-4738-B1C3-FA69DEC60116}"/>
+          </ac:spMkLst>
+        </pc:spChg>
+        <pc:spChg chg="add mod">
+          <ac:chgData name="Cynthia Enciso" userId="7915927f-c5cf-4e1f-876d-e79882ad52fa" providerId="ADAL" clId="{ED60EBD3-90AC-49DF-9FC1-4EEE9F91A7A4}" dt="2021-05-11T14:09:47.033" v="103" actId="20577"/>
+          <ac:spMkLst>
+            <pc:docMk/>
+            <pc:sldMk cId="111416777" sldId="278"/>
+            <ac:spMk id="9" creationId="{9BFA40FE-DAE1-41DC-82C6-94BCBAC4F8B7}"/>
+          </ac:spMkLst>
+        </pc:spChg>
+        <pc:spChg chg="add mod">
+          <ac:chgData name="Cynthia Enciso" userId="7915927f-c5cf-4e1f-876d-e79882ad52fa" providerId="ADAL" clId="{ED60EBD3-90AC-49DF-9FC1-4EEE9F91A7A4}" dt="2021-05-11T14:09:06.554" v="58" actId="14100"/>
+          <ac:spMkLst>
+            <pc:docMk/>
+            <pc:sldMk cId="111416777" sldId="278"/>
+            <ac:spMk id="10" creationId="{7389173F-EAC4-4761-932C-2242F37F6B29}"/>
+          </ac:spMkLst>
+        </pc:spChg>
+        <pc:spChg chg="add mod">
+          <ac:chgData name="Cynthia Enciso" userId="7915927f-c5cf-4e1f-876d-e79882ad52fa" providerId="ADAL" clId="{ED60EBD3-90AC-49DF-9FC1-4EEE9F91A7A4}" dt="2021-05-11T14:09:21.814" v="71" actId="1076"/>
+          <ac:spMkLst>
+            <pc:docMk/>
+            <pc:sldMk cId="111416777" sldId="278"/>
+            <ac:spMk id="11" creationId="{0E49D18F-930B-4E66-ABA2-717C0C59BB06}"/>
+          </ac:spMkLst>
+        </pc:spChg>
+        <pc:spChg chg="add mod">
+          <ac:chgData name="Cynthia Enciso" userId="7915927f-c5cf-4e1f-876d-e79882ad52fa" providerId="ADAL" clId="{ED60EBD3-90AC-49DF-9FC1-4EEE9F91A7A4}" dt="2021-05-11T14:09:38.054" v="73" actId="20577"/>
+          <ac:spMkLst>
+            <pc:docMk/>
+            <pc:sldMk cId="111416777" sldId="278"/>
+            <ac:spMk id="12" creationId="{AA861D57-4EA9-4960-9C88-72B950049AAB}"/>
+          </ac:spMkLst>
+        </pc:spChg>
+        <pc:spChg chg="add mod">
+          <ac:chgData name="Cynthia Enciso" userId="7915927f-c5cf-4e1f-876d-e79882ad52fa" providerId="ADAL" clId="{ED60EBD3-90AC-49DF-9FC1-4EEE9F91A7A4}" dt="2021-05-11T14:09:59.893" v="123" actId="20577"/>
+          <ac:spMkLst>
+            <pc:docMk/>
+            <pc:sldMk cId="111416777" sldId="278"/>
+            <ac:spMk id="13" creationId="{C317E9EF-F6A3-4C70-B939-E2FFE510E71F}"/>
+          </ac:spMkLst>
+        </pc:spChg>
+        <pc:spChg chg="add mod">
+          <ac:chgData name="Cynthia Enciso" userId="7915927f-c5cf-4e1f-876d-e79882ad52fa" providerId="ADAL" clId="{ED60EBD3-90AC-49DF-9FC1-4EEE9F91A7A4}" dt="2021-05-11T14:31:19.088" v="416" actId="1076"/>
+          <ac:spMkLst>
+            <pc:docMk/>
+            <pc:sldMk cId="111416777" sldId="278"/>
+            <ac:spMk id="18" creationId="{E01D1E1C-5089-4E09-B9C7-14ACFE2B5C64}"/>
+          </ac:spMkLst>
+        </pc:spChg>
+        <pc:cxnChg chg="add">
+          <ac:chgData name="Cynthia Enciso" userId="7915927f-c5cf-4e1f-876d-e79882ad52fa" providerId="ADAL" clId="{ED60EBD3-90AC-49DF-9FC1-4EEE9F91A7A4}" dt="2021-05-11T14:10:05.373" v="124" actId="11529"/>
+          <ac:cxnSpMkLst>
+            <pc:docMk/>
+            <pc:sldMk cId="111416777" sldId="278"/>
+            <ac:cxnSpMk id="15" creationId="{3BBBCB2E-756D-4029-A899-3B71BB64B121}"/>
+          </ac:cxnSpMkLst>
+        </pc:cxnChg>
+        <pc:cxnChg chg="add mod">
+          <ac:chgData name="Cynthia Enciso" userId="7915927f-c5cf-4e1f-876d-e79882ad52fa" providerId="ADAL" clId="{ED60EBD3-90AC-49DF-9FC1-4EEE9F91A7A4}" dt="2021-05-11T14:10:10.729" v="126" actId="14100"/>
+          <ac:cxnSpMkLst>
+            <pc:docMk/>
+            <pc:sldMk cId="111416777" sldId="278"/>
+            <ac:cxnSpMk id="16" creationId="{1FC6BEC3-D66C-4CAE-9B6F-0369BDA66379}"/>
+          </ac:cxnSpMkLst>
+        </pc:cxnChg>
+      </pc:sldChg>
+      <pc:sldChg chg="addSp delSp modSp new del mod">
+        <pc:chgData name="Cynthia Enciso" userId="7915927f-c5cf-4e1f-876d-e79882ad52fa" providerId="ADAL" clId="{ED60EBD3-90AC-49DF-9FC1-4EEE9F91A7A4}" dt="2021-05-11T14:17:39.877" v="131" actId="2696"/>
+        <pc:sldMkLst>
+          <pc:docMk/>
+          <pc:sldMk cId="1849037767" sldId="279"/>
+        </pc:sldMkLst>
+        <pc:spChg chg="del">
+          <ac:chgData name="Cynthia Enciso" userId="7915927f-c5cf-4e1f-876d-e79882ad52fa" providerId="ADAL" clId="{ED60EBD3-90AC-49DF-9FC1-4EEE9F91A7A4}" dt="2021-05-11T14:17:16.944" v="128" actId="478"/>
+          <ac:spMkLst>
+            <pc:docMk/>
+            <pc:sldMk cId="1849037767" sldId="279"/>
+            <ac:spMk id="3" creationId="{A5B01F7A-FCEF-4EE2-ACA7-D242BB0FFCB2}"/>
+          </ac:spMkLst>
+        </pc:spChg>
+        <pc:spChg chg="add del mod">
+          <ac:chgData name="Cynthia Enciso" userId="7915927f-c5cf-4e1f-876d-e79882ad52fa" providerId="ADAL" clId="{ED60EBD3-90AC-49DF-9FC1-4EEE9F91A7A4}" dt="2021-05-11T14:17:35.325" v="130" actId="478"/>
+          <ac:spMkLst>
+            <pc:docMk/>
+            <pc:sldMk cId="1849037767" sldId="279"/>
+            <ac:spMk id="5" creationId="{D82A3BF7-0535-4A43-8DAF-81AC5772F649}"/>
+          </ac:spMkLst>
+        </pc:spChg>
+        <pc:spChg chg="add mod">
+          <ac:chgData name="Cynthia Enciso" userId="7915927f-c5cf-4e1f-876d-e79882ad52fa" providerId="ADAL" clId="{ED60EBD3-90AC-49DF-9FC1-4EEE9F91A7A4}" dt="2021-05-11T14:17:22.108" v="129"/>
+          <ac:spMkLst>
+            <pc:docMk/>
+            <pc:sldMk cId="1849037767" sldId="279"/>
+            <ac:spMk id="6" creationId="{1DDAA484-418F-454D-B1D0-FF0E00D671B6}"/>
+          </ac:spMkLst>
+        </pc:spChg>
+        <pc:spChg chg="add mod">
+          <ac:chgData name="Cynthia Enciso" userId="7915927f-c5cf-4e1f-876d-e79882ad52fa" providerId="ADAL" clId="{ED60EBD3-90AC-49DF-9FC1-4EEE9F91A7A4}" dt="2021-05-11T14:17:22.108" v="129"/>
+          <ac:spMkLst>
+            <pc:docMk/>
+            <pc:sldMk cId="1849037767" sldId="279"/>
+            <ac:spMk id="7" creationId="{6B52A878-B9CA-4562-A5E8-EAD991073C43}"/>
+          </ac:spMkLst>
+        </pc:spChg>
+        <pc:spChg chg="add del mod">
+          <ac:chgData name="Cynthia Enciso" userId="7915927f-c5cf-4e1f-876d-e79882ad52fa" providerId="ADAL" clId="{ED60EBD3-90AC-49DF-9FC1-4EEE9F91A7A4}" dt="2021-05-11T14:17:35.325" v="130" actId="478"/>
+          <ac:spMkLst>
+            <pc:docMk/>
+            <pc:sldMk cId="1849037767" sldId="279"/>
+            <ac:spMk id="8" creationId="{4EEEBCD5-56FC-46A2-9626-02DAE31BF8D4}"/>
+          </ac:spMkLst>
+        </pc:spChg>
+        <pc:spChg chg="add del mod">
+          <ac:chgData name="Cynthia Enciso" userId="7915927f-c5cf-4e1f-876d-e79882ad52fa" providerId="ADAL" clId="{ED60EBD3-90AC-49DF-9FC1-4EEE9F91A7A4}" dt="2021-05-11T14:17:35.325" v="130" actId="478"/>
+          <ac:spMkLst>
+            <pc:docMk/>
+            <pc:sldMk cId="1849037767" sldId="279"/>
+            <ac:spMk id="9" creationId="{816DCB65-5A64-495A-8525-7AE1EC0029A7}"/>
+          </ac:spMkLst>
+        </pc:spChg>
+        <pc:spChg chg="add del mod">
+          <ac:chgData name="Cynthia Enciso" userId="7915927f-c5cf-4e1f-876d-e79882ad52fa" providerId="ADAL" clId="{ED60EBD3-90AC-49DF-9FC1-4EEE9F91A7A4}" dt="2021-05-11T14:17:35.325" v="130" actId="478"/>
+          <ac:spMkLst>
+            <pc:docMk/>
+            <pc:sldMk cId="1849037767" sldId="279"/>
+            <ac:spMk id="10" creationId="{EE02DE05-6102-414C-A54C-45698FF5C62E}"/>
+          </ac:spMkLst>
+        </pc:spChg>
+        <pc:spChg chg="add del mod">
+          <ac:chgData name="Cynthia Enciso" userId="7915927f-c5cf-4e1f-876d-e79882ad52fa" providerId="ADAL" clId="{ED60EBD3-90AC-49DF-9FC1-4EEE9F91A7A4}" dt="2021-05-11T14:17:35.325" v="130" actId="478"/>
+          <ac:spMkLst>
+            <pc:docMk/>
+            <pc:sldMk cId="1849037767" sldId="279"/>
+            <ac:spMk id="11" creationId="{CF032A19-1C10-4C73-9186-2838C6C4BE3D}"/>
+          </ac:spMkLst>
+        </pc:spChg>
+        <pc:spChg chg="add del mod">
+          <ac:chgData name="Cynthia Enciso" userId="7915927f-c5cf-4e1f-876d-e79882ad52fa" providerId="ADAL" clId="{ED60EBD3-90AC-49DF-9FC1-4EEE9F91A7A4}" dt="2021-05-11T14:17:35.325" v="130" actId="478"/>
+          <ac:spMkLst>
+            <pc:docMk/>
+            <pc:sldMk cId="1849037767" sldId="279"/>
+            <ac:spMk id="12" creationId="{AED96DB5-59BB-4B28-9EF1-BD7BA7C5C6B1}"/>
+          </ac:spMkLst>
+        </pc:spChg>
+        <pc:spChg chg="add del mod">
+          <ac:chgData name="Cynthia Enciso" userId="7915927f-c5cf-4e1f-876d-e79882ad52fa" providerId="ADAL" clId="{ED60EBD3-90AC-49DF-9FC1-4EEE9F91A7A4}" dt="2021-05-11T14:17:35.325" v="130" actId="478"/>
+          <ac:spMkLst>
+            <pc:docMk/>
+            <pc:sldMk cId="1849037767" sldId="279"/>
+            <ac:spMk id="13" creationId="{BB3C5705-B3ED-4C21-8CE6-A02DF9FAACAF}"/>
+          </ac:spMkLst>
+        </pc:spChg>
+        <pc:cxnChg chg="add del mod">
+          <ac:chgData name="Cynthia Enciso" userId="7915927f-c5cf-4e1f-876d-e79882ad52fa" providerId="ADAL" clId="{ED60EBD3-90AC-49DF-9FC1-4EEE9F91A7A4}" dt="2021-05-11T14:17:35.325" v="130" actId="478"/>
+          <ac:cxnSpMkLst>
+            <pc:docMk/>
+            <pc:sldMk cId="1849037767" sldId="279"/>
+            <ac:cxnSpMk id="14" creationId="{7AC7D2F9-D07A-475A-98C3-4CE967BC292E}"/>
+          </ac:cxnSpMkLst>
+        </pc:cxnChg>
+        <pc:cxnChg chg="add del mod">
+          <ac:chgData name="Cynthia Enciso" userId="7915927f-c5cf-4e1f-876d-e79882ad52fa" providerId="ADAL" clId="{ED60EBD3-90AC-49DF-9FC1-4EEE9F91A7A4}" dt="2021-05-11T14:17:35.325" v="130" actId="478"/>
+          <ac:cxnSpMkLst>
+            <pc:docMk/>
+            <pc:sldMk cId="1849037767" sldId="279"/>
+            <ac:cxnSpMk id="15" creationId="{D8D617E4-D6AA-4D0D-A505-782E4C4C47E5}"/>
+          </ac:cxnSpMkLst>
+        </pc:cxnChg>
+      </pc:sldChg>
+      <pc:sldChg chg="addSp delSp modSp new mod">
+        <pc:chgData name="Cynthia Enciso" userId="7915927f-c5cf-4e1f-876d-e79882ad52fa" providerId="ADAL" clId="{ED60EBD3-90AC-49DF-9FC1-4EEE9F91A7A4}" dt="2021-05-11T21:22:14.441" v="803" actId="20577"/>
+        <pc:sldMkLst>
+          <pc:docMk/>
+          <pc:sldMk cId="3546549088" sldId="279"/>
+        </pc:sldMkLst>
+        <pc:spChg chg="del">
+          <ac:chgData name="Cynthia Enciso" userId="7915927f-c5cf-4e1f-876d-e79882ad52fa" providerId="ADAL" clId="{ED60EBD3-90AC-49DF-9FC1-4EEE9F91A7A4}" dt="2021-05-11T14:19:00.685" v="133" actId="478"/>
+          <ac:spMkLst>
+            <pc:docMk/>
+            <pc:sldMk cId="3546549088" sldId="279"/>
+            <ac:spMk id="3" creationId="{390A5EF9-B584-4529-A566-F8005DD33846}"/>
+          </ac:spMkLst>
+        </pc:spChg>
+        <pc:spChg chg="add mod">
+          <ac:chgData name="Cynthia Enciso" userId="7915927f-c5cf-4e1f-876d-e79882ad52fa" providerId="ADAL" clId="{ED60EBD3-90AC-49DF-9FC1-4EEE9F91A7A4}" dt="2021-05-11T14:23:03.876" v="275" actId="1076"/>
+          <ac:spMkLst>
+            <pc:docMk/>
+            <pc:sldMk cId="3546549088" sldId="279"/>
+            <ac:spMk id="5" creationId="{D3473C4C-285D-4255-B8C8-103EECD1959B}"/>
+          </ac:spMkLst>
+        </pc:spChg>
+        <pc:spChg chg="add mod">
+          <ac:chgData name="Cynthia Enciso" userId="7915927f-c5cf-4e1f-876d-e79882ad52fa" providerId="ADAL" clId="{ED60EBD3-90AC-49DF-9FC1-4EEE9F91A7A4}" dt="2021-05-11T21:19:43.261" v="801" actId="20578"/>
+          <ac:spMkLst>
+            <pc:docMk/>
+            <pc:sldMk cId="3546549088" sldId="279"/>
+            <ac:spMk id="6" creationId="{69FA37D9-1DC2-45F4-AE5C-95ED6052DBA1}"/>
+          </ac:spMkLst>
+        </pc:spChg>
+        <pc:spChg chg="add mod">
+          <ac:chgData name="Cynthia Enciso" userId="7915927f-c5cf-4e1f-876d-e79882ad52fa" providerId="ADAL" clId="{ED60EBD3-90AC-49DF-9FC1-4EEE9F91A7A4}" dt="2021-05-11T14:50:15.340" v="596" actId="20577"/>
+          <ac:spMkLst>
+            <pc:docMk/>
+            <pc:sldMk cId="3546549088" sldId="279"/>
+            <ac:spMk id="7" creationId="{35CE87E0-2A5E-43C1-AC1C-46EEE6C61513}"/>
+          </ac:spMkLst>
+        </pc:spChg>
+        <pc:spChg chg="add mod">
+          <ac:chgData name="Cynthia Enciso" userId="7915927f-c5cf-4e1f-876d-e79882ad52fa" providerId="ADAL" clId="{ED60EBD3-90AC-49DF-9FC1-4EEE9F91A7A4}" dt="2021-05-11T21:22:14.441" v="803" actId="20577"/>
+          <ac:spMkLst>
+            <pc:docMk/>
+            <pc:sldMk cId="3546549088" sldId="279"/>
+            <ac:spMk id="9" creationId="{713B55F1-7E96-485A-A35D-8A02F7001932}"/>
+          </ac:spMkLst>
+        </pc:spChg>
+        <pc:spChg chg="add mod">
+          <ac:chgData name="Cynthia Enciso" userId="7915927f-c5cf-4e1f-876d-e79882ad52fa" providerId="ADAL" clId="{ED60EBD3-90AC-49DF-9FC1-4EEE9F91A7A4}" dt="2021-05-11T14:23:05.862" v="276" actId="1076"/>
+          <ac:spMkLst>
+            <pc:docMk/>
+            <pc:sldMk cId="3546549088" sldId="279"/>
+            <ac:spMk id="11" creationId="{304A5ECF-1BC2-4E9B-B0F9-DC5D63B3BC8F}"/>
+          </ac:spMkLst>
+        </pc:spChg>
+        <pc:spChg chg="add mod">
+          <ac:chgData name="Cynthia Enciso" userId="7915927f-c5cf-4e1f-876d-e79882ad52fa" providerId="ADAL" clId="{ED60EBD3-90AC-49DF-9FC1-4EEE9F91A7A4}" dt="2021-05-11T21:19:45.813" v="802" actId="1076"/>
+          <ac:spMkLst>
+            <pc:docMk/>
+            <pc:sldMk cId="3546549088" sldId="279"/>
+            <ac:spMk id="12" creationId="{45D8670F-86B7-4EC9-8CDF-65303ECC2EA4}"/>
+          </ac:spMkLst>
+        </pc:spChg>
+        <pc:spChg chg="add del mod">
+          <ac:chgData name="Cynthia Enciso" userId="7915927f-c5cf-4e1f-876d-e79882ad52fa" providerId="ADAL" clId="{ED60EBD3-90AC-49DF-9FC1-4EEE9F91A7A4}" dt="2021-05-11T15:16:11.215" v="622" actId="21"/>
+          <ac:spMkLst>
+            <pc:docMk/>
+            <pc:sldMk cId="3546549088" sldId="279"/>
+            <ac:spMk id="13" creationId="{D4FEBEFC-844F-464E-98DF-E634CB78F41A}"/>
+          </ac:spMkLst>
+        </pc:spChg>
+      </pc:sldChg>
+      <pc:sldChg chg="addSp delSp modSp new del mod">
+        <pc:chgData name="Cynthia Enciso" userId="7915927f-c5cf-4e1f-876d-e79882ad52fa" providerId="ADAL" clId="{ED60EBD3-90AC-49DF-9FC1-4EEE9F91A7A4}" dt="2021-05-11T14:49:47.256" v="594" actId="47"/>
+        <pc:sldMkLst>
+          <pc:docMk/>
+          <pc:sldMk cId="1701855086" sldId="280"/>
+        </pc:sldMkLst>
+        <pc:spChg chg="del">
+          <ac:chgData name="Cynthia Enciso" userId="7915927f-c5cf-4e1f-876d-e79882ad52fa" providerId="ADAL" clId="{ED60EBD3-90AC-49DF-9FC1-4EEE9F91A7A4}" dt="2021-05-11T14:27:22.426" v="309" actId="478"/>
+          <ac:spMkLst>
+            <pc:docMk/>
+            <pc:sldMk cId="1701855086" sldId="280"/>
+            <ac:spMk id="3" creationId="{59DEC80E-3EB3-451C-811F-BC970919FB6B}"/>
+          </ac:spMkLst>
+        </pc:spChg>
+        <pc:spChg chg="add mod">
+          <ac:chgData name="Cynthia Enciso" userId="7915927f-c5cf-4e1f-876d-e79882ad52fa" providerId="ADAL" clId="{ED60EBD3-90AC-49DF-9FC1-4EEE9F91A7A4}" dt="2021-05-11T14:35:33.802" v="570" actId="14100"/>
+          <ac:spMkLst>
+            <pc:docMk/>
+            <pc:sldMk cId="1701855086" sldId="280"/>
+            <ac:spMk id="5" creationId="{C1AF383A-9424-43F8-8C4D-369C748DC9A6}"/>
+          </ac:spMkLst>
+        </pc:spChg>
+        <pc:spChg chg="add mod">
+          <ac:chgData name="Cynthia Enciso" userId="7915927f-c5cf-4e1f-876d-e79882ad52fa" providerId="ADAL" clId="{ED60EBD3-90AC-49DF-9FC1-4EEE9F91A7A4}" dt="2021-05-11T14:35:33.802" v="570" actId="14100"/>
+          <ac:spMkLst>
+            <pc:docMk/>
+            <pc:sldMk cId="1701855086" sldId="280"/>
+            <ac:spMk id="6" creationId="{E0BC7619-A425-4A92-B339-4FC362C7C9EF}"/>
+          </ac:spMkLst>
+        </pc:spChg>
+        <pc:spChg chg="add del mod">
+          <ac:chgData name="Cynthia Enciso" userId="7915927f-c5cf-4e1f-876d-e79882ad52fa" providerId="ADAL" clId="{ED60EBD3-90AC-49DF-9FC1-4EEE9F91A7A4}" dt="2021-05-11T14:33:49.518" v="515" actId="478"/>
+          <ac:spMkLst>
+            <pc:docMk/>
+            <pc:sldMk cId="1701855086" sldId="280"/>
+            <ac:spMk id="7" creationId="{64764DB5-DA90-4454-BFF4-4BFE4104A2B7}"/>
+          </ac:spMkLst>
+        </pc:spChg>
+        <pc:spChg chg="add del mod topLvl">
+          <ac:chgData name="Cynthia Enciso" userId="7915927f-c5cf-4e1f-876d-e79882ad52fa" providerId="ADAL" clId="{ED60EBD3-90AC-49DF-9FC1-4EEE9F91A7A4}" dt="2021-05-11T14:49:45.645" v="593" actId="478"/>
+          <ac:spMkLst>
+            <pc:docMk/>
+            <pc:sldMk cId="1701855086" sldId="280"/>
+            <ac:spMk id="8" creationId="{54059B98-7A9B-4575-915F-F8803862DB82}"/>
+          </ac:spMkLst>
+        </pc:spChg>
+        <pc:spChg chg="add del mod topLvl">
+          <ac:chgData name="Cynthia Enciso" userId="7915927f-c5cf-4e1f-876d-e79882ad52fa" providerId="ADAL" clId="{ED60EBD3-90AC-49DF-9FC1-4EEE9F91A7A4}" dt="2021-05-11T14:36:00.842" v="575" actId="478"/>
+          <ac:spMkLst>
+            <pc:docMk/>
+            <pc:sldMk cId="1701855086" sldId="280"/>
+            <ac:spMk id="9" creationId="{1CA03CE3-B2F3-4F91-839D-385E7644E4DD}"/>
+          </ac:spMkLst>
+        </pc:spChg>
+        <pc:spChg chg="mod">
+          <ac:chgData name="Cynthia Enciso" userId="7915927f-c5cf-4e1f-876d-e79882ad52fa" providerId="ADAL" clId="{ED60EBD3-90AC-49DF-9FC1-4EEE9F91A7A4}" dt="2021-05-11T14:34:49.584" v="536" actId="571"/>
+          <ac:spMkLst>
+            <pc:docMk/>
+            <pc:sldMk cId="1701855086" sldId="280"/>
+            <ac:spMk id="13" creationId="{B9D27E03-B12D-4AE9-91CF-CC0A2A98A719}"/>
+          </ac:spMkLst>
+        </pc:spChg>
+        <pc:spChg chg="mod">
+          <ac:chgData name="Cynthia Enciso" userId="7915927f-c5cf-4e1f-876d-e79882ad52fa" providerId="ADAL" clId="{ED60EBD3-90AC-49DF-9FC1-4EEE9F91A7A4}" dt="2021-05-11T14:34:49.584" v="536" actId="571"/>
+          <ac:spMkLst>
+            <pc:docMk/>
+            <pc:sldMk cId="1701855086" sldId="280"/>
+            <ac:spMk id="14" creationId="{0D365DC7-2F2F-423B-8105-807AE13EC8E3}"/>
+          </ac:spMkLst>
+        </pc:spChg>
+        <pc:spChg chg="add mod">
+          <ac:chgData name="Cynthia Enciso" userId="7915927f-c5cf-4e1f-876d-e79882ad52fa" providerId="ADAL" clId="{ED60EBD3-90AC-49DF-9FC1-4EEE9F91A7A4}" dt="2021-05-11T14:36:30.787" v="589" actId="1076"/>
+          <ac:spMkLst>
+            <pc:docMk/>
+            <pc:sldMk cId="1701855086" sldId="280"/>
+            <ac:spMk id="15" creationId="{E6A96F14-8E88-4926-9D7A-E3A25F1887EC}"/>
+          </ac:spMkLst>
+        </pc:spChg>
+        <pc:grpChg chg="add del mod">
+          <ac:chgData name="Cynthia Enciso" userId="7915927f-c5cf-4e1f-876d-e79882ad52fa" providerId="ADAL" clId="{ED60EBD3-90AC-49DF-9FC1-4EEE9F91A7A4}" dt="2021-05-11T14:34:34.449" v="529" actId="165"/>
+          <ac:grpSpMkLst>
+            <pc:docMk/>
+            <pc:sldMk cId="1701855086" sldId="280"/>
+            <ac:grpSpMk id="10" creationId="{EE169C50-F455-4BF2-8E9D-3C739535E63D}"/>
+          </ac:grpSpMkLst>
+        </pc:grpChg>
+        <pc:grpChg chg="add del mod">
+          <ac:chgData name="Cynthia Enciso" userId="7915927f-c5cf-4e1f-876d-e79882ad52fa" providerId="ADAL" clId="{ED60EBD3-90AC-49DF-9FC1-4EEE9F91A7A4}" dt="2021-05-11T14:35:58.010" v="574" actId="165"/>
+          <ac:grpSpMkLst>
+            <pc:docMk/>
+            <pc:sldMk cId="1701855086" sldId="280"/>
+            <ac:grpSpMk id="11" creationId="{CCA5A781-A4B4-407F-AE9B-794BE57F2B14}"/>
+          </ac:grpSpMkLst>
+        </pc:grpChg>
+        <pc:grpChg chg="add mod">
+          <ac:chgData name="Cynthia Enciso" userId="7915927f-c5cf-4e1f-876d-e79882ad52fa" providerId="ADAL" clId="{ED60EBD3-90AC-49DF-9FC1-4EEE9F91A7A4}" dt="2021-05-11T14:34:49.584" v="536" actId="571"/>
+          <ac:grpSpMkLst>
+            <pc:docMk/>
+            <pc:sldMk cId="1701855086" sldId="280"/>
+            <ac:grpSpMk id="12" creationId="{11874C69-A657-4C86-BB89-A82F8EA5DFBE}"/>
+          </ac:grpSpMkLst>
+        </pc:grpChg>
+      </pc:sldChg>
+    </pc:docChg>
+  </pc:docChgLst>
+  <pc:docChgLst>
+    <pc:chgData name="Cynthia Enciso" userId="7915927f-c5cf-4e1f-876d-e79882ad52fa" providerId="ADAL" clId="{3A0B43FD-B2EC-4CFD-A72A-86AB109D932D}"/>
+    <pc:docChg chg="undo custSel addSld delSld modSld sldOrd">
+      <pc:chgData name="Cynthia Enciso" userId="7915927f-c5cf-4e1f-876d-e79882ad52fa" providerId="ADAL" clId="{3A0B43FD-B2EC-4CFD-A72A-86AB109D932D}" dt="2021-06-15T21:12:55.105" v="180" actId="571"/>
+      <pc:docMkLst>
+        <pc:docMk/>
+      </pc:docMkLst>
+      <pc:sldChg chg="addSp modSp mod ord">
+        <pc:chgData name="Cynthia Enciso" userId="7915927f-c5cf-4e1f-876d-e79882ad52fa" providerId="ADAL" clId="{3A0B43FD-B2EC-4CFD-A72A-86AB109D932D}" dt="2021-06-15T20:12:43.633" v="124" actId="21"/>
+        <pc:sldMkLst>
+          <pc:docMk/>
+          <pc:sldMk cId="0" sldId="258"/>
+        </pc:sldMkLst>
+        <pc:spChg chg="add mod">
+          <ac:chgData name="Cynthia Enciso" userId="7915927f-c5cf-4e1f-876d-e79882ad52fa" providerId="ADAL" clId="{3A0B43FD-B2EC-4CFD-A72A-86AB109D932D}" dt="2021-06-15T20:12:43.633" v="124" actId="21"/>
+          <ac:spMkLst>
+            <pc:docMk/>
+            <pc:sldMk cId="0" sldId="258"/>
+            <ac:spMk id="2" creationId="{6BC2824E-1AE3-441E-BFFF-F545CF5A68B3}"/>
+          </ac:spMkLst>
+        </pc:spChg>
+      </pc:sldChg>
+      <pc:sldChg chg="delSp mod">
+        <pc:chgData name="Cynthia Enciso" userId="7915927f-c5cf-4e1f-876d-e79882ad52fa" providerId="ADAL" clId="{3A0B43FD-B2EC-4CFD-A72A-86AB109D932D}" dt="2021-06-15T20:12:04.276" v="90" actId="21"/>
+        <pc:sldMkLst>
+          <pc:docMk/>
+          <pc:sldMk cId="0" sldId="259"/>
+        </pc:sldMkLst>
+        <pc:spChg chg="del">
+          <ac:chgData name="Cynthia Enciso" userId="7915927f-c5cf-4e1f-876d-e79882ad52fa" providerId="ADAL" clId="{3A0B43FD-B2EC-4CFD-A72A-86AB109D932D}" dt="2021-06-15T20:12:04.276" v="90" actId="21"/>
+          <ac:spMkLst>
+            <pc:docMk/>
+            <pc:sldMk cId="0" sldId="259"/>
+            <ac:spMk id="5" creationId="{EC29FA11-EBC8-4E68-A3F5-10B28AAD6865}"/>
+          </ac:spMkLst>
+        </pc:spChg>
+      </pc:sldChg>
+      <pc:sldChg chg="del">
+        <pc:chgData name="Cynthia Enciso" userId="7915927f-c5cf-4e1f-876d-e79882ad52fa" providerId="ADAL" clId="{3A0B43FD-B2EC-4CFD-A72A-86AB109D932D}" dt="2021-06-15T20:11:16.890" v="87" actId="47"/>
+        <pc:sldMkLst>
+          <pc:docMk/>
+          <pc:sldMk cId="0" sldId="260"/>
+        </pc:sldMkLst>
+      </pc:sldChg>
+      <pc:sldChg chg="del">
+        <pc:chgData name="Cynthia Enciso" userId="7915927f-c5cf-4e1f-876d-e79882ad52fa" providerId="ADAL" clId="{3A0B43FD-B2EC-4CFD-A72A-86AB109D932D}" dt="2021-06-15T20:11:16.890" v="87" actId="47"/>
+        <pc:sldMkLst>
+          <pc:docMk/>
+          <pc:sldMk cId="0" sldId="261"/>
+        </pc:sldMkLst>
+      </pc:sldChg>
+      <pc:sldChg chg="addSp modSp mod">
+        <pc:chgData name="Cynthia Enciso" userId="7915927f-c5cf-4e1f-876d-e79882ad52fa" providerId="ADAL" clId="{3A0B43FD-B2EC-4CFD-A72A-86AB109D932D}" dt="2021-06-15T20:19:01.572" v="148" actId="20577"/>
+        <pc:sldMkLst>
+          <pc:docMk/>
+          <pc:sldMk cId="0" sldId="262"/>
+        </pc:sldMkLst>
+        <pc:spChg chg="add mod">
+          <ac:chgData name="Cynthia Enciso" userId="7915927f-c5cf-4e1f-876d-e79882ad52fa" providerId="ADAL" clId="{3A0B43FD-B2EC-4CFD-A72A-86AB109D932D}" dt="2021-06-15T20:19:01.572" v="148" actId="20577"/>
+          <ac:spMkLst>
+            <pc:docMk/>
+            <pc:sldMk cId="0" sldId="262"/>
+            <ac:spMk id="2" creationId="{457C0CF2-BBE3-4787-8BA6-A93125C54DA8}"/>
+          </ac:spMkLst>
+        </pc:spChg>
+      </pc:sldChg>
+      <pc:sldChg chg="addSp modSp mod">
+        <pc:chgData name="Cynthia Enciso" userId="7915927f-c5cf-4e1f-876d-e79882ad52fa" providerId="ADAL" clId="{3A0B43FD-B2EC-4CFD-A72A-86AB109D932D}" dt="2021-06-15T20:20:17.114" v="161" actId="20577"/>
+        <pc:sldMkLst>
+          <pc:docMk/>
+          <pc:sldMk cId="0" sldId="268"/>
+        </pc:sldMkLst>
+        <pc:spChg chg="add mod">
+          <ac:chgData name="Cynthia Enciso" userId="7915927f-c5cf-4e1f-876d-e79882ad52fa" providerId="ADAL" clId="{3A0B43FD-B2EC-4CFD-A72A-86AB109D932D}" dt="2021-06-15T20:20:17.114" v="161" actId="20577"/>
+          <ac:spMkLst>
+            <pc:docMk/>
+            <pc:sldMk cId="0" sldId="268"/>
+            <ac:spMk id="2" creationId="{4A53F78D-DFA1-4CCE-8535-4B68BC052D31}"/>
+          </ac:spMkLst>
+        </pc:spChg>
+      </pc:sldChg>
+      <pc:sldChg chg="addSp modSp mod">
+        <pc:chgData name="Cynthia Enciso" userId="7915927f-c5cf-4e1f-876d-e79882ad52fa" providerId="ADAL" clId="{3A0B43FD-B2EC-4CFD-A72A-86AB109D932D}" dt="2021-06-15T20:12:51.229" v="127" actId="20577"/>
+        <pc:sldMkLst>
+          <pc:docMk/>
+          <pc:sldMk cId="0" sldId="272"/>
+        </pc:sldMkLst>
+        <pc:spChg chg="add mod">
+          <ac:chgData name="Cynthia Enciso" userId="7915927f-c5cf-4e1f-876d-e79882ad52fa" providerId="ADAL" clId="{3A0B43FD-B2EC-4CFD-A72A-86AB109D932D}" dt="2021-06-15T20:12:51.229" v="127" actId="20577"/>
+          <ac:spMkLst>
+            <pc:docMk/>
+            <pc:sldMk cId="0" sldId="272"/>
+            <ac:spMk id="6" creationId="{F0CBA842-3FFB-4AD2-983C-954F6BC7FCCF}"/>
+          </ac:spMkLst>
+        </pc:spChg>
+      </pc:sldChg>
+      <pc:sldChg chg="modSp mod">
+        <pc:chgData name="Cynthia Enciso" userId="7915927f-c5cf-4e1f-876d-e79882ad52fa" providerId="ADAL" clId="{3A0B43FD-B2EC-4CFD-A72A-86AB109D932D}" dt="2021-06-15T21:06:05.394" v="163" actId="114"/>
+        <pc:sldMkLst>
+          <pc:docMk/>
+          <pc:sldMk cId="1814177333" sldId="276"/>
+        </pc:sldMkLst>
+        <pc:spChg chg="mod">
+          <ac:chgData name="Cynthia Enciso" userId="7915927f-c5cf-4e1f-876d-e79882ad52fa" providerId="ADAL" clId="{3A0B43FD-B2EC-4CFD-A72A-86AB109D932D}" dt="2021-06-15T21:06:05.394" v="163" actId="114"/>
+          <ac:spMkLst>
+            <pc:docMk/>
+            <pc:sldMk cId="1814177333" sldId="276"/>
+            <ac:spMk id="233" creationId="{00000000-0000-0000-0000-000000000000}"/>
+          </ac:spMkLst>
+        </pc:spChg>
+      </pc:sldChg>
+      <pc:sldChg chg="del">
+        <pc:chgData name="Cynthia Enciso" userId="7915927f-c5cf-4e1f-876d-e79882ad52fa" providerId="ADAL" clId="{3A0B43FD-B2EC-4CFD-A72A-86AB109D932D}" dt="2021-06-15T20:11:16.890" v="87" actId="47"/>
+        <pc:sldMkLst>
+          <pc:docMk/>
+          <pc:sldMk cId="2102769417" sldId="277"/>
+        </pc:sldMkLst>
+      </pc:sldChg>
+      <pc:sldChg chg="addSp modSp mod ord">
+        <pc:chgData name="Cynthia Enciso" userId="7915927f-c5cf-4e1f-876d-e79882ad52fa" providerId="ADAL" clId="{3A0B43FD-B2EC-4CFD-A72A-86AB109D932D}" dt="2021-06-15T21:12:55.105" v="180" actId="571"/>
+        <pc:sldMkLst>
+          <pc:docMk/>
+          <pc:sldMk cId="111416777" sldId="278"/>
+        </pc:sldMkLst>
+        <pc:spChg chg="add mod">
+          <ac:chgData name="Cynthia Enciso" userId="7915927f-c5cf-4e1f-876d-e79882ad52fa" providerId="ADAL" clId="{3A0B43FD-B2EC-4CFD-A72A-86AB109D932D}" dt="2021-06-15T21:12:53.431" v="179" actId="1076"/>
+          <ac:spMkLst>
+            <pc:docMk/>
+            <pc:sldMk cId="111416777" sldId="278"/>
+            <ac:spMk id="3" creationId="{693CCB9D-7A32-438E-8BB4-BAD63D54CFBD}"/>
+          </ac:spMkLst>
+        </pc:spChg>
+        <pc:spChg chg="mod">
+          <ac:chgData name="Cynthia Enciso" userId="7915927f-c5cf-4e1f-876d-e79882ad52fa" providerId="ADAL" clId="{3A0B43FD-B2EC-4CFD-A72A-86AB109D932D}" dt="2021-06-15T19:35:44.869" v="85" actId="20577"/>
+          <ac:spMkLst>
+            <pc:docMk/>
+            <pc:sldMk cId="111416777" sldId="278"/>
+            <ac:spMk id="11" creationId="{0E49D18F-930B-4E66-ABA2-717C0C59BB06}"/>
+          </ac:spMkLst>
+        </pc:spChg>
+        <pc:spChg chg="mod">
+          <ac:chgData name="Cynthia Enciso" userId="7915927f-c5cf-4e1f-876d-e79882ad52fa" providerId="ADAL" clId="{3A0B43FD-B2EC-4CFD-A72A-86AB109D932D}" dt="2021-06-15T21:12:48.480" v="177" actId="20577"/>
+          <ac:spMkLst>
+            <pc:docMk/>
+            <pc:sldMk cId="111416777" sldId="278"/>
+            <ac:spMk id="13" creationId="{C317E9EF-F6A3-4C70-B939-E2FFE510E71F}"/>
+          </ac:spMkLst>
+        </pc:spChg>
+        <pc:spChg chg="add mod">
+          <ac:chgData name="Cynthia Enciso" userId="7915927f-c5cf-4e1f-876d-e79882ad52fa" providerId="ADAL" clId="{3A0B43FD-B2EC-4CFD-A72A-86AB109D932D}" dt="2021-06-15T21:12:55.105" v="180" actId="571"/>
+          <ac:spMkLst>
+            <pc:docMk/>
+            <pc:sldMk cId="111416777" sldId="278"/>
+            <ac:spMk id="17" creationId="{1FA4E003-A16A-4DE4-AC75-3414F16BCCEC}"/>
+          </ac:spMkLst>
+        </pc:spChg>
+      </pc:sldChg>
+      <pc:sldChg chg="modSp mod ord">
+        <pc:chgData name="Cynthia Enciso" userId="7915927f-c5cf-4e1f-876d-e79882ad52fa" providerId="ADAL" clId="{3A0B43FD-B2EC-4CFD-A72A-86AB109D932D}" dt="2021-06-15T20:11:51.419" v="89"/>
+        <pc:sldMkLst>
+          <pc:docMk/>
+          <pc:sldMk cId="3546549088" sldId="279"/>
+        </pc:sldMkLst>
+        <pc:spChg chg="mod">
+          <ac:chgData name="Cynthia Enciso" userId="7915927f-c5cf-4e1f-876d-e79882ad52fa" providerId="ADAL" clId="{3A0B43FD-B2EC-4CFD-A72A-86AB109D932D}" dt="2021-06-15T19:37:24.021" v="86" actId="1076"/>
+          <ac:spMkLst>
+            <pc:docMk/>
+            <pc:sldMk cId="3546549088" sldId="279"/>
+            <ac:spMk id="12" creationId="{45D8670F-86B7-4EC9-8CDF-65303ECC2EA4}"/>
+          </ac:spMkLst>
+        </pc:spChg>
+      </pc:sldChg>
+      <pc:sldChg chg="modSp new mod">
+        <pc:chgData name="Cynthia Enciso" userId="7915927f-c5cf-4e1f-876d-e79882ad52fa" providerId="ADAL" clId="{3A0B43FD-B2EC-4CFD-A72A-86AB109D932D}" dt="2021-06-15T18:22:57.814" v="33" actId="20577"/>
+        <pc:sldMkLst>
+          <pc:docMk/>
+          <pc:sldMk cId="3038891659" sldId="280"/>
+        </pc:sldMkLst>
+        <pc:spChg chg="mod">
+          <ac:chgData name="Cynthia Enciso" userId="7915927f-c5cf-4e1f-876d-e79882ad52fa" providerId="ADAL" clId="{3A0B43FD-B2EC-4CFD-A72A-86AB109D932D}" dt="2021-06-15T18:22:53.113" v="6" actId="20577"/>
+          <ac:spMkLst>
+            <pc:docMk/>
+            <pc:sldMk cId="3038891659" sldId="280"/>
+            <ac:spMk id="2" creationId="{B31D38A9-2D57-4CDF-9097-CDB26A342298}"/>
+          </ac:spMkLst>
+        </pc:spChg>
+        <pc:spChg chg="mod">
+          <ac:chgData name="Cynthia Enciso" userId="7915927f-c5cf-4e1f-876d-e79882ad52fa" providerId="ADAL" clId="{3A0B43FD-B2EC-4CFD-A72A-86AB109D932D}" dt="2021-06-15T18:22:57.814" v="33" actId="20577"/>
+          <ac:spMkLst>
+            <pc:docMk/>
+            <pc:sldMk cId="3038891659" sldId="280"/>
+            <ac:spMk id="3" creationId="{4A99C0C4-D732-41ED-8554-14713CDC53D6}"/>
+          </ac:spMkLst>
+        </pc:spChg>
+      </pc:sldChg>
+    </pc:docChg>
+  </pc:docChgLst>
   <pc:docChgLst>
     <pc:chgData name="Cynthia Enciso" userId="7915927f-c5cf-4e1f-876d-e79882ad52fa" providerId="ADAL" clId="{406D9A5D-CD57-49F6-A3C2-E180543E482D}"/>
     <pc:docChg chg="undo redo custSel addSld delSld modSld sldOrd">
@@ -1630,203 +2306,6 @@
     </pc:docChg>
   </pc:docChgLst>
   <pc:docChgLst>
-    <pc:chgData name="Cynthia Enciso" userId="7915927f-c5cf-4e1f-876d-e79882ad52fa" providerId="ADAL" clId="{3A0B43FD-B2EC-4CFD-A72A-86AB109D932D}"/>
-    <pc:docChg chg="undo custSel addSld delSld modSld sldOrd">
-      <pc:chgData name="Cynthia Enciso" userId="7915927f-c5cf-4e1f-876d-e79882ad52fa" providerId="ADAL" clId="{3A0B43FD-B2EC-4CFD-A72A-86AB109D932D}" dt="2021-06-15T21:12:55.105" v="180" actId="571"/>
-      <pc:docMkLst>
-        <pc:docMk/>
-      </pc:docMkLst>
-      <pc:sldChg chg="addSp modSp mod ord">
-        <pc:chgData name="Cynthia Enciso" userId="7915927f-c5cf-4e1f-876d-e79882ad52fa" providerId="ADAL" clId="{3A0B43FD-B2EC-4CFD-A72A-86AB109D932D}" dt="2021-06-15T20:12:43.633" v="124" actId="21"/>
-        <pc:sldMkLst>
-          <pc:docMk/>
-          <pc:sldMk cId="0" sldId="258"/>
-        </pc:sldMkLst>
-        <pc:spChg chg="add mod">
-          <ac:chgData name="Cynthia Enciso" userId="7915927f-c5cf-4e1f-876d-e79882ad52fa" providerId="ADAL" clId="{3A0B43FD-B2EC-4CFD-A72A-86AB109D932D}" dt="2021-06-15T20:12:43.633" v="124" actId="21"/>
-          <ac:spMkLst>
-            <pc:docMk/>
-            <pc:sldMk cId="0" sldId="258"/>
-            <ac:spMk id="2" creationId="{6BC2824E-1AE3-441E-BFFF-F545CF5A68B3}"/>
-          </ac:spMkLst>
-        </pc:spChg>
-      </pc:sldChg>
-      <pc:sldChg chg="delSp mod">
-        <pc:chgData name="Cynthia Enciso" userId="7915927f-c5cf-4e1f-876d-e79882ad52fa" providerId="ADAL" clId="{3A0B43FD-B2EC-4CFD-A72A-86AB109D932D}" dt="2021-06-15T20:12:04.276" v="90" actId="21"/>
-        <pc:sldMkLst>
-          <pc:docMk/>
-          <pc:sldMk cId="0" sldId="259"/>
-        </pc:sldMkLst>
-        <pc:spChg chg="del">
-          <ac:chgData name="Cynthia Enciso" userId="7915927f-c5cf-4e1f-876d-e79882ad52fa" providerId="ADAL" clId="{3A0B43FD-B2EC-4CFD-A72A-86AB109D932D}" dt="2021-06-15T20:12:04.276" v="90" actId="21"/>
-          <ac:spMkLst>
-            <pc:docMk/>
-            <pc:sldMk cId="0" sldId="259"/>
-            <ac:spMk id="5" creationId="{EC29FA11-EBC8-4E68-A3F5-10B28AAD6865}"/>
-          </ac:spMkLst>
-        </pc:spChg>
-      </pc:sldChg>
-      <pc:sldChg chg="del">
-        <pc:chgData name="Cynthia Enciso" userId="7915927f-c5cf-4e1f-876d-e79882ad52fa" providerId="ADAL" clId="{3A0B43FD-B2EC-4CFD-A72A-86AB109D932D}" dt="2021-06-15T20:11:16.890" v="87" actId="47"/>
-        <pc:sldMkLst>
-          <pc:docMk/>
-          <pc:sldMk cId="0" sldId="260"/>
-        </pc:sldMkLst>
-      </pc:sldChg>
-      <pc:sldChg chg="del">
-        <pc:chgData name="Cynthia Enciso" userId="7915927f-c5cf-4e1f-876d-e79882ad52fa" providerId="ADAL" clId="{3A0B43FD-B2EC-4CFD-A72A-86AB109D932D}" dt="2021-06-15T20:11:16.890" v="87" actId="47"/>
-        <pc:sldMkLst>
-          <pc:docMk/>
-          <pc:sldMk cId="0" sldId="261"/>
-        </pc:sldMkLst>
-      </pc:sldChg>
-      <pc:sldChg chg="addSp modSp mod">
-        <pc:chgData name="Cynthia Enciso" userId="7915927f-c5cf-4e1f-876d-e79882ad52fa" providerId="ADAL" clId="{3A0B43FD-B2EC-4CFD-A72A-86AB109D932D}" dt="2021-06-15T20:19:01.572" v="148" actId="20577"/>
-        <pc:sldMkLst>
-          <pc:docMk/>
-          <pc:sldMk cId="0" sldId="262"/>
-        </pc:sldMkLst>
-        <pc:spChg chg="add mod">
-          <ac:chgData name="Cynthia Enciso" userId="7915927f-c5cf-4e1f-876d-e79882ad52fa" providerId="ADAL" clId="{3A0B43FD-B2EC-4CFD-A72A-86AB109D932D}" dt="2021-06-15T20:19:01.572" v="148" actId="20577"/>
-          <ac:spMkLst>
-            <pc:docMk/>
-            <pc:sldMk cId="0" sldId="262"/>
-            <ac:spMk id="2" creationId="{457C0CF2-BBE3-4787-8BA6-A93125C54DA8}"/>
-          </ac:spMkLst>
-        </pc:spChg>
-      </pc:sldChg>
-      <pc:sldChg chg="addSp modSp mod">
-        <pc:chgData name="Cynthia Enciso" userId="7915927f-c5cf-4e1f-876d-e79882ad52fa" providerId="ADAL" clId="{3A0B43FD-B2EC-4CFD-A72A-86AB109D932D}" dt="2021-06-15T20:20:17.114" v="161" actId="20577"/>
-        <pc:sldMkLst>
-          <pc:docMk/>
-          <pc:sldMk cId="0" sldId="268"/>
-        </pc:sldMkLst>
-        <pc:spChg chg="add mod">
-          <ac:chgData name="Cynthia Enciso" userId="7915927f-c5cf-4e1f-876d-e79882ad52fa" providerId="ADAL" clId="{3A0B43FD-B2EC-4CFD-A72A-86AB109D932D}" dt="2021-06-15T20:20:17.114" v="161" actId="20577"/>
-          <ac:spMkLst>
-            <pc:docMk/>
-            <pc:sldMk cId="0" sldId="268"/>
-            <ac:spMk id="2" creationId="{4A53F78D-DFA1-4CCE-8535-4B68BC052D31}"/>
-          </ac:spMkLst>
-        </pc:spChg>
-      </pc:sldChg>
-      <pc:sldChg chg="addSp modSp mod">
-        <pc:chgData name="Cynthia Enciso" userId="7915927f-c5cf-4e1f-876d-e79882ad52fa" providerId="ADAL" clId="{3A0B43FD-B2EC-4CFD-A72A-86AB109D932D}" dt="2021-06-15T20:12:51.229" v="127" actId="20577"/>
-        <pc:sldMkLst>
-          <pc:docMk/>
-          <pc:sldMk cId="0" sldId="272"/>
-        </pc:sldMkLst>
-        <pc:spChg chg="add mod">
-          <ac:chgData name="Cynthia Enciso" userId="7915927f-c5cf-4e1f-876d-e79882ad52fa" providerId="ADAL" clId="{3A0B43FD-B2EC-4CFD-A72A-86AB109D932D}" dt="2021-06-15T20:12:51.229" v="127" actId="20577"/>
-          <ac:spMkLst>
-            <pc:docMk/>
-            <pc:sldMk cId="0" sldId="272"/>
-            <ac:spMk id="6" creationId="{F0CBA842-3FFB-4AD2-983C-954F6BC7FCCF}"/>
-          </ac:spMkLst>
-        </pc:spChg>
-      </pc:sldChg>
-      <pc:sldChg chg="modSp mod">
-        <pc:chgData name="Cynthia Enciso" userId="7915927f-c5cf-4e1f-876d-e79882ad52fa" providerId="ADAL" clId="{3A0B43FD-B2EC-4CFD-A72A-86AB109D932D}" dt="2021-06-15T21:06:05.394" v="163" actId="114"/>
-        <pc:sldMkLst>
-          <pc:docMk/>
-          <pc:sldMk cId="1814177333" sldId="276"/>
-        </pc:sldMkLst>
-        <pc:spChg chg="mod">
-          <ac:chgData name="Cynthia Enciso" userId="7915927f-c5cf-4e1f-876d-e79882ad52fa" providerId="ADAL" clId="{3A0B43FD-B2EC-4CFD-A72A-86AB109D932D}" dt="2021-06-15T21:06:05.394" v="163" actId="114"/>
-          <ac:spMkLst>
-            <pc:docMk/>
-            <pc:sldMk cId="1814177333" sldId="276"/>
-            <ac:spMk id="233" creationId="{00000000-0000-0000-0000-000000000000}"/>
-          </ac:spMkLst>
-        </pc:spChg>
-      </pc:sldChg>
-      <pc:sldChg chg="del">
-        <pc:chgData name="Cynthia Enciso" userId="7915927f-c5cf-4e1f-876d-e79882ad52fa" providerId="ADAL" clId="{3A0B43FD-B2EC-4CFD-A72A-86AB109D932D}" dt="2021-06-15T20:11:16.890" v="87" actId="47"/>
-        <pc:sldMkLst>
-          <pc:docMk/>
-          <pc:sldMk cId="2102769417" sldId="277"/>
-        </pc:sldMkLst>
-      </pc:sldChg>
-      <pc:sldChg chg="addSp modSp mod ord">
-        <pc:chgData name="Cynthia Enciso" userId="7915927f-c5cf-4e1f-876d-e79882ad52fa" providerId="ADAL" clId="{3A0B43FD-B2EC-4CFD-A72A-86AB109D932D}" dt="2021-06-15T21:12:55.105" v="180" actId="571"/>
-        <pc:sldMkLst>
-          <pc:docMk/>
-          <pc:sldMk cId="111416777" sldId="278"/>
-        </pc:sldMkLst>
-        <pc:spChg chg="add mod">
-          <ac:chgData name="Cynthia Enciso" userId="7915927f-c5cf-4e1f-876d-e79882ad52fa" providerId="ADAL" clId="{3A0B43FD-B2EC-4CFD-A72A-86AB109D932D}" dt="2021-06-15T21:12:53.431" v="179" actId="1076"/>
-          <ac:spMkLst>
-            <pc:docMk/>
-            <pc:sldMk cId="111416777" sldId="278"/>
-            <ac:spMk id="3" creationId="{693CCB9D-7A32-438E-8BB4-BAD63D54CFBD}"/>
-          </ac:spMkLst>
-        </pc:spChg>
-        <pc:spChg chg="mod">
-          <ac:chgData name="Cynthia Enciso" userId="7915927f-c5cf-4e1f-876d-e79882ad52fa" providerId="ADAL" clId="{3A0B43FD-B2EC-4CFD-A72A-86AB109D932D}" dt="2021-06-15T19:35:44.869" v="85" actId="20577"/>
-          <ac:spMkLst>
-            <pc:docMk/>
-            <pc:sldMk cId="111416777" sldId="278"/>
-            <ac:spMk id="11" creationId="{0E49D18F-930B-4E66-ABA2-717C0C59BB06}"/>
-          </ac:spMkLst>
-        </pc:spChg>
-        <pc:spChg chg="mod">
-          <ac:chgData name="Cynthia Enciso" userId="7915927f-c5cf-4e1f-876d-e79882ad52fa" providerId="ADAL" clId="{3A0B43FD-B2EC-4CFD-A72A-86AB109D932D}" dt="2021-06-15T21:12:48.480" v="177" actId="20577"/>
-          <ac:spMkLst>
-            <pc:docMk/>
-            <pc:sldMk cId="111416777" sldId="278"/>
-            <ac:spMk id="13" creationId="{C317E9EF-F6A3-4C70-B939-E2FFE510E71F}"/>
-          </ac:spMkLst>
-        </pc:spChg>
-        <pc:spChg chg="add mod">
-          <ac:chgData name="Cynthia Enciso" userId="7915927f-c5cf-4e1f-876d-e79882ad52fa" providerId="ADAL" clId="{3A0B43FD-B2EC-4CFD-A72A-86AB109D932D}" dt="2021-06-15T21:12:55.105" v="180" actId="571"/>
-          <ac:spMkLst>
-            <pc:docMk/>
-            <pc:sldMk cId="111416777" sldId="278"/>
-            <ac:spMk id="17" creationId="{1FA4E003-A16A-4DE4-AC75-3414F16BCCEC}"/>
-          </ac:spMkLst>
-        </pc:spChg>
-      </pc:sldChg>
-      <pc:sldChg chg="modSp mod ord">
-        <pc:chgData name="Cynthia Enciso" userId="7915927f-c5cf-4e1f-876d-e79882ad52fa" providerId="ADAL" clId="{3A0B43FD-B2EC-4CFD-A72A-86AB109D932D}" dt="2021-06-15T20:11:51.419" v="89"/>
-        <pc:sldMkLst>
-          <pc:docMk/>
-          <pc:sldMk cId="3546549088" sldId="279"/>
-        </pc:sldMkLst>
-        <pc:spChg chg="mod">
-          <ac:chgData name="Cynthia Enciso" userId="7915927f-c5cf-4e1f-876d-e79882ad52fa" providerId="ADAL" clId="{3A0B43FD-B2EC-4CFD-A72A-86AB109D932D}" dt="2021-06-15T19:37:24.021" v="86" actId="1076"/>
-          <ac:spMkLst>
-            <pc:docMk/>
-            <pc:sldMk cId="3546549088" sldId="279"/>
-            <ac:spMk id="12" creationId="{45D8670F-86B7-4EC9-8CDF-65303ECC2EA4}"/>
-          </ac:spMkLst>
-        </pc:spChg>
-      </pc:sldChg>
-      <pc:sldChg chg="modSp new mod">
-        <pc:chgData name="Cynthia Enciso" userId="7915927f-c5cf-4e1f-876d-e79882ad52fa" providerId="ADAL" clId="{3A0B43FD-B2EC-4CFD-A72A-86AB109D932D}" dt="2021-06-15T18:22:57.814" v="33" actId="20577"/>
-        <pc:sldMkLst>
-          <pc:docMk/>
-          <pc:sldMk cId="3038891659" sldId="280"/>
-        </pc:sldMkLst>
-        <pc:spChg chg="mod">
-          <ac:chgData name="Cynthia Enciso" userId="7915927f-c5cf-4e1f-876d-e79882ad52fa" providerId="ADAL" clId="{3A0B43FD-B2EC-4CFD-A72A-86AB109D932D}" dt="2021-06-15T18:22:53.113" v="6" actId="20577"/>
-          <ac:spMkLst>
-            <pc:docMk/>
-            <pc:sldMk cId="3038891659" sldId="280"/>
-            <ac:spMk id="2" creationId="{B31D38A9-2D57-4CDF-9097-CDB26A342298}"/>
-          </ac:spMkLst>
-        </pc:spChg>
-        <pc:spChg chg="mod">
-          <ac:chgData name="Cynthia Enciso" userId="7915927f-c5cf-4e1f-876d-e79882ad52fa" providerId="ADAL" clId="{3A0B43FD-B2EC-4CFD-A72A-86AB109D932D}" dt="2021-06-15T18:22:57.814" v="33" actId="20577"/>
-          <ac:spMkLst>
-            <pc:docMk/>
-            <pc:sldMk cId="3038891659" sldId="280"/>
-            <ac:spMk id="3" creationId="{4A99C0C4-D732-41ED-8554-14713CDC53D6}"/>
-          </ac:spMkLst>
-        </pc:spChg>
-      </pc:sldChg>
-    </pc:docChg>
-  </pc:docChgLst>
-  <pc:docChgLst>
     <pc:chgData name="Cynthia Enciso" userId="7915927f-c5cf-4e1f-876d-e79882ad52fa" providerId="ADAL" clId="{8C77B812-4FE7-422B-970B-CDB55EF74933}"/>
     <pc:docChg chg="undo custSel addSld delSld modSld sldOrd">
       <pc:chgData name="Cynthia Enciso" userId="7915927f-c5cf-4e1f-876d-e79882ad52fa" providerId="ADAL" clId="{8C77B812-4FE7-422B-970B-CDB55EF74933}" dt="2021-10-26T21:13:32.975" v="1424" actId="20577"/>
@@ -2219,485 +2698,6 @@
             <ac:cxnSpMk id="26" creationId="{B97AD56D-65FB-4FC9-935E-5E6FE726EF6D}"/>
           </ac:cxnSpMkLst>
         </pc:cxnChg>
-      </pc:sldChg>
-    </pc:docChg>
-  </pc:docChgLst>
-  <pc:docChgLst>
-    <pc:chgData name="Cynthia Enciso" userId="7915927f-c5cf-4e1f-876d-e79882ad52fa" providerId="ADAL" clId="{ED60EBD3-90AC-49DF-9FC1-4EEE9F91A7A4}"/>
-    <pc:docChg chg="undo redo custSel addSld delSld modSld">
-      <pc:chgData name="Cynthia Enciso" userId="7915927f-c5cf-4e1f-876d-e79882ad52fa" providerId="ADAL" clId="{ED60EBD3-90AC-49DF-9FC1-4EEE9F91A7A4}" dt="2021-05-11T21:22:14.441" v="803" actId="20577"/>
-      <pc:docMkLst>
-        <pc:docMk/>
-      </pc:docMkLst>
-      <pc:sldChg chg="addSp delSp modSp mod">
-        <pc:chgData name="Cynthia Enciso" userId="7915927f-c5cf-4e1f-876d-e79882ad52fa" providerId="ADAL" clId="{ED60EBD3-90AC-49DF-9FC1-4EEE9F91A7A4}" dt="2021-05-11T21:15:41.825" v="799" actId="478"/>
-        <pc:sldMkLst>
-          <pc:docMk/>
-          <pc:sldMk cId="0" sldId="257"/>
-        </pc:sldMkLst>
-        <pc:spChg chg="add del mod">
-          <ac:chgData name="Cynthia Enciso" userId="7915927f-c5cf-4e1f-876d-e79882ad52fa" providerId="ADAL" clId="{ED60EBD3-90AC-49DF-9FC1-4EEE9F91A7A4}" dt="2021-05-11T21:15:41.825" v="799" actId="478"/>
-          <ac:spMkLst>
-            <pc:docMk/>
-            <pc:sldMk cId="0" sldId="257"/>
-            <ac:spMk id="2" creationId="{61F721CD-1E39-4ABA-BF97-A494BA22AA33}"/>
-          </ac:spMkLst>
-        </pc:spChg>
-      </pc:sldChg>
-      <pc:sldChg chg="modSp mod">
-        <pc:chgData name="Cynthia Enciso" userId="7915927f-c5cf-4e1f-876d-e79882ad52fa" providerId="ADAL" clId="{ED60EBD3-90AC-49DF-9FC1-4EEE9F91A7A4}" dt="2021-05-11T14:33:13.540" v="492" actId="14100"/>
-        <pc:sldMkLst>
-          <pc:docMk/>
-          <pc:sldMk cId="0" sldId="258"/>
-        </pc:sldMkLst>
-        <pc:spChg chg="mod">
-          <ac:chgData name="Cynthia Enciso" userId="7915927f-c5cf-4e1f-876d-e79882ad52fa" providerId="ADAL" clId="{ED60EBD3-90AC-49DF-9FC1-4EEE9F91A7A4}" dt="2021-05-11T14:33:13.540" v="492" actId="14100"/>
-          <ac:spMkLst>
-            <pc:docMk/>
-            <pc:sldMk cId="0" sldId="258"/>
-            <ac:spMk id="226" creationId="{00000000-0000-0000-0000-000000000000}"/>
-          </ac:spMkLst>
-        </pc:spChg>
-      </pc:sldChg>
-      <pc:sldChg chg="addSp modSp mod">
-        <pc:chgData name="Cynthia Enciso" userId="7915927f-c5cf-4e1f-876d-e79882ad52fa" providerId="ADAL" clId="{ED60EBD3-90AC-49DF-9FC1-4EEE9F91A7A4}" dt="2021-05-11T15:27:37.610" v="653" actId="14100"/>
-        <pc:sldMkLst>
-          <pc:docMk/>
-          <pc:sldMk cId="0" sldId="259"/>
-        </pc:sldMkLst>
-        <pc:spChg chg="add mod">
-          <ac:chgData name="Cynthia Enciso" userId="7915927f-c5cf-4e1f-876d-e79882ad52fa" providerId="ADAL" clId="{ED60EBD3-90AC-49DF-9FC1-4EEE9F91A7A4}" dt="2021-05-11T15:27:37.610" v="653" actId="14100"/>
-          <ac:spMkLst>
-            <pc:docMk/>
-            <pc:sldMk cId="0" sldId="259"/>
-            <ac:spMk id="5" creationId="{EC29FA11-EBC8-4E68-A3F5-10B28AAD6865}"/>
-          </ac:spMkLst>
-        </pc:spChg>
-      </pc:sldChg>
-      <pc:sldChg chg="del">
-        <pc:chgData name="Cynthia Enciso" userId="7915927f-c5cf-4e1f-876d-e79882ad52fa" providerId="ADAL" clId="{ED60EBD3-90AC-49DF-9FC1-4EEE9F91A7A4}" dt="2021-05-11T17:05:22.002" v="654" actId="47"/>
-        <pc:sldMkLst>
-          <pc:docMk/>
-          <pc:sldMk cId="0" sldId="264"/>
-        </pc:sldMkLst>
-      </pc:sldChg>
-      <pc:sldChg chg="modSp mod">
-        <pc:chgData name="Cynthia Enciso" userId="7915927f-c5cf-4e1f-876d-e79882ad52fa" providerId="ADAL" clId="{ED60EBD3-90AC-49DF-9FC1-4EEE9F91A7A4}" dt="2021-05-11T17:20:41.685" v="775" actId="14100"/>
-        <pc:sldMkLst>
-          <pc:docMk/>
-          <pc:sldMk cId="0" sldId="266"/>
-        </pc:sldMkLst>
-        <pc:spChg chg="mod">
-          <ac:chgData name="Cynthia Enciso" userId="7915927f-c5cf-4e1f-876d-e79882ad52fa" providerId="ADAL" clId="{ED60EBD3-90AC-49DF-9FC1-4EEE9F91A7A4}" dt="2021-05-11T17:20:41.685" v="775" actId="14100"/>
-          <ac:spMkLst>
-            <pc:docMk/>
-            <pc:sldMk cId="0" sldId="266"/>
-            <ac:spMk id="3" creationId="{B191859A-9A4C-4DDF-89BD-47134E6C4842}"/>
-          </ac:spMkLst>
-        </pc:spChg>
-      </pc:sldChg>
-      <pc:sldChg chg="modSp mod">
-        <pc:chgData name="Cynthia Enciso" userId="7915927f-c5cf-4e1f-876d-e79882ad52fa" providerId="ADAL" clId="{ED60EBD3-90AC-49DF-9FC1-4EEE9F91A7A4}" dt="2021-05-11T17:12:57.940" v="773" actId="20577"/>
-        <pc:sldMkLst>
-          <pc:docMk/>
-          <pc:sldMk cId="2546056288" sldId="274"/>
-        </pc:sldMkLst>
-        <pc:spChg chg="mod">
-          <ac:chgData name="Cynthia Enciso" userId="7915927f-c5cf-4e1f-876d-e79882ad52fa" providerId="ADAL" clId="{ED60EBD3-90AC-49DF-9FC1-4EEE9F91A7A4}" dt="2021-05-11T17:12:57.940" v="773" actId="20577"/>
-          <ac:spMkLst>
-            <pc:docMk/>
-            <pc:sldMk cId="2546056288" sldId="274"/>
-            <ac:spMk id="9" creationId="{8DCC4198-E08D-4604-B165-0E6553F9902B}"/>
-          </ac:spMkLst>
-        </pc:spChg>
-      </pc:sldChg>
-      <pc:sldChg chg="addSp delSp modSp new mod">
-        <pc:chgData name="Cynthia Enciso" userId="7915927f-c5cf-4e1f-876d-e79882ad52fa" providerId="ADAL" clId="{ED60EBD3-90AC-49DF-9FC1-4EEE9F91A7A4}" dt="2021-05-11T14:31:19.088" v="416" actId="1076"/>
-        <pc:sldMkLst>
-          <pc:docMk/>
-          <pc:sldMk cId="111416777" sldId="278"/>
-        </pc:sldMkLst>
-        <pc:spChg chg="del">
-          <ac:chgData name="Cynthia Enciso" userId="7915927f-c5cf-4e1f-876d-e79882ad52fa" providerId="ADAL" clId="{ED60EBD3-90AC-49DF-9FC1-4EEE9F91A7A4}" dt="2021-05-11T14:08:07.417" v="1" actId="478"/>
-          <ac:spMkLst>
-            <pc:docMk/>
-            <pc:sldMk cId="111416777" sldId="278"/>
-            <ac:spMk id="3" creationId="{A1D32090-8B52-4D3C-AEAB-B83F39FD2F0A}"/>
-          </ac:spMkLst>
-        </pc:spChg>
-        <pc:spChg chg="add mod">
-          <ac:chgData name="Cynthia Enciso" userId="7915927f-c5cf-4e1f-876d-e79882ad52fa" providerId="ADAL" clId="{ED60EBD3-90AC-49DF-9FC1-4EEE9F91A7A4}" dt="2021-05-11T14:08:13.696" v="3" actId="13822"/>
-          <ac:spMkLst>
-            <pc:docMk/>
-            <pc:sldMk cId="111416777" sldId="278"/>
-            <ac:spMk id="5" creationId="{F2A760AB-011A-4307-95B1-956C56F2E5C9}"/>
-          </ac:spMkLst>
-        </pc:spChg>
-        <pc:spChg chg="add mod">
-          <ac:chgData name="Cynthia Enciso" userId="7915927f-c5cf-4e1f-876d-e79882ad52fa" providerId="ADAL" clId="{ED60EBD3-90AC-49DF-9FC1-4EEE9F91A7A4}" dt="2021-05-11T14:08:23.688" v="9" actId="1076"/>
-          <ac:spMkLst>
-            <pc:docMk/>
-            <pc:sldMk cId="111416777" sldId="278"/>
-            <ac:spMk id="6" creationId="{6CC213E8-A3E0-45A2-B971-6D3F9624E54E}"/>
-          </ac:spMkLst>
-        </pc:spChg>
-        <pc:spChg chg="add mod">
-          <ac:chgData name="Cynthia Enciso" userId="7915927f-c5cf-4e1f-876d-e79882ad52fa" providerId="ADAL" clId="{ED60EBD3-90AC-49DF-9FC1-4EEE9F91A7A4}" dt="2021-05-11T14:08:30.776" v="13" actId="1076"/>
-          <ac:spMkLst>
-            <pc:docMk/>
-            <pc:sldMk cId="111416777" sldId="278"/>
-            <ac:spMk id="7" creationId="{FEFE4E76-5193-4E48-B4AF-545C0F6EE91C}"/>
-          </ac:spMkLst>
-        </pc:spChg>
-        <pc:spChg chg="add mod">
-          <ac:chgData name="Cynthia Enciso" userId="7915927f-c5cf-4e1f-876d-e79882ad52fa" providerId="ADAL" clId="{ED60EBD3-90AC-49DF-9FC1-4EEE9F91A7A4}" dt="2021-05-11T14:08:40.744" v="28" actId="20577"/>
-          <ac:spMkLst>
-            <pc:docMk/>
-            <pc:sldMk cId="111416777" sldId="278"/>
-            <ac:spMk id="8" creationId="{77F69B0E-E074-4738-B1C3-FA69DEC60116}"/>
-          </ac:spMkLst>
-        </pc:spChg>
-        <pc:spChg chg="add mod">
-          <ac:chgData name="Cynthia Enciso" userId="7915927f-c5cf-4e1f-876d-e79882ad52fa" providerId="ADAL" clId="{ED60EBD3-90AC-49DF-9FC1-4EEE9F91A7A4}" dt="2021-05-11T14:09:47.033" v="103" actId="20577"/>
-          <ac:spMkLst>
-            <pc:docMk/>
-            <pc:sldMk cId="111416777" sldId="278"/>
-            <ac:spMk id="9" creationId="{9BFA40FE-DAE1-41DC-82C6-94BCBAC4F8B7}"/>
-          </ac:spMkLst>
-        </pc:spChg>
-        <pc:spChg chg="add mod">
-          <ac:chgData name="Cynthia Enciso" userId="7915927f-c5cf-4e1f-876d-e79882ad52fa" providerId="ADAL" clId="{ED60EBD3-90AC-49DF-9FC1-4EEE9F91A7A4}" dt="2021-05-11T14:09:06.554" v="58" actId="14100"/>
-          <ac:spMkLst>
-            <pc:docMk/>
-            <pc:sldMk cId="111416777" sldId="278"/>
-            <ac:spMk id="10" creationId="{7389173F-EAC4-4761-932C-2242F37F6B29}"/>
-          </ac:spMkLst>
-        </pc:spChg>
-        <pc:spChg chg="add mod">
-          <ac:chgData name="Cynthia Enciso" userId="7915927f-c5cf-4e1f-876d-e79882ad52fa" providerId="ADAL" clId="{ED60EBD3-90AC-49DF-9FC1-4EEE9F91A7A4}" dt="2021-05-11T14:09:21.814" v="71" actId="1076"/>
-          <ac:spMkLst>
-            <pc:docMk/>
-            <pc:sldMk cId="111416777" sldId="278"/>
-            <ac:spMk id="11" creationId="{0E49D18F-930B-4E66-ABA2-717C0C59BB06}"/>
-          </ac:spMkLst>
-        </pc:spChg>
-        <pc:spChg chg="add mod">
-          <ac:chgData name="Cynthia Enciso" userId="7915927f-c5cf-4e1f-876d-e79882ad52fa" providerId="ADAL" clId="{ED60EBD3-90AC-49DF-9FC1-4EEE9F91A7A4}" dt="2021-05-11T14:09:38.054" v="73" actId="20577"/>
-          <ac:spMkLst>
-            <pc:docMk/>
-            <pc:sldMk cId="111416777" sldId="278"/>
-            <ac:spMk id="12" creationId="{AA861D57-4EA9-4960-9C88-72B950049AAB}"/>
-          </ac:spMkLst>
-        </pc:spChg>
-        <pc:spChg chg="add mod">
-          <ac:chgData name="Cynthia Enciso" userId="7915927f-c5cf-4e1f-876d-e79882ad52fa" providerId="ADAL" clId="{ED60EBD3-90AC-49DF-9FC1-4EEE9F91A7A4}" dt="2021-05-11T14:09:59.893" v="123" actId="20577"/>
-          <ac:spMkLst>
-            <pc:docMk/>
-            <pc:sldMk cId="111416777" sldId="278"/>
-            <ac:spMk id="13" creationId="{C317E9EF-F6A3-4C70-B939-E2FFE510E71F}"/>
-          </ac:spMkLst>
-        </pc:spChg>
-        <pc:spChg chg="add mod">
-          <ac:chgData name="Cynthia Enciso" userId="7915927f-c5cf-4e1f-876d-e79882ad52fa" providerId="ADAL" clId="{ED60EBD3-90AC-49DF-9FC1-4EEE9F91A7A4}" dt="2021-05-11T14:31:19.088" v="416" actId="1076"/>
-          <ac:spMkLst>
-            <pc:docMk/>
-            <pc:sldMk cId="111416777" sldId="278"/>
-            <ac:spMk id="18" creationId="{E01D1E1C-5089-4E09-B9C7-14ACFE2B5C64}"/>
-          </ac:spMkLst>
-        </pc:spChg>
-        <pc:cxnChg chg="add">
-          <ac:chgData name="Cynthia Enciso" userId="7915927f-c5cf-4e1f-876d-e79882ad52fa" providerId="ADAL" clId="{ED60EBD3-90AC-49DF-9FC1-4EEE9F91A7A4}" dt="2021-05-11T14:10:05.373" v="124" actId="11529"/>
-          <ac:cxnSpMkLst>
-            <pc:docMk/>
-            <pc:sldMk cId="111416777" sldId="278"/>
-            <ac:cxnSpMk id="15" creationId="{3BBBCB2E-756D-4029-A899-3B71BB64B121}"/>
-          </ac:cxnSpMkLst>
-        </pc:cxnChg>
-        <pc:cxnChg chg="add mod">
-          <ac:chgData name="Cynthia Enciso" userId="7915927f-c5cf-4e1f-876d-e79882ad52fa" providerId="ADAL" clId="{ED60EBD3-90AC-49DF-9FC1-4EEE9F91A7A4}" dt="2021-05-11T14:10:10.729" v="126" actId="14100"/>
-          <ac:cxnSpMkLst>
-            <pc:docMk/>
-            <pc:sldMk cId="111416777" sldId="278"/>
-            <ac:cxnSpMk id="16" creationId="{1FC6BEC3-D66C-4CAE-9B6F-0369BDA66379}"/>
-          </ac:cxnSpMkLst>
-        </pc:cxnChg>
-      </pc:sldChg>
-      <pc:sldChg chg="addSp delSp modSp new del mod">
-        <pc:chgData name="Cynthia Enciso" userId="7915927f-c5cf-4e1f-876d-e79882ad52fa" providerId="ADAL" clId="{ED60EBD3-90AC-49DF-9FC1-4EEE9F91A7A4}" dt="2021-05-11T14:17:39.877" v="131" actId="2696"/>
-        <pc:sldMkLst>
-          <pc:docMk/>
-          <pc:sldMk cId="1849037767" sldId="279"/>
-        </pc:sldMkLst>
-        <pc:spChg chg="del">
-          <ac:chgData name="Cynthia Enciso" userId="7915927f-c5cf-4e1f-876d-e79882ad52fa" providerId="ADAL" clId="{ED60EBD3-90AC-49DF-9FC1-4EEE9F91A7A4}" dt="2021-05-11T14:17:16.944" v="128" actId="478"/>
-          <ac:spMkLst>
-            <pc:docMk/>
-            <pc:sldMk cId="1849037767" sldId="279"/>
-            <ac:spMk id="3" creationId="{A5B01F7A-FCEF-4EE2-ACA7-D242BB0FFCB2}"/>
-          </ac:spMkLst>
-        </pc:spChg>
-        <pc:spChg chg="add del mod">
-          <ac:chgData name="Cynthia Enciso" userId="7915927f-c5cf-4e1f-876d-e79882ad52fa" providerId="ADAL" clId="{ED60EBD3-90AC-49DF-9FC1-4EEE9F91A7A4}" dt="2021-05-11T14:17:35.325" v="130" actId="478"/>
-          <ac:spMkLst>
-            <pc:docMk/>
-            <pc:sldMk cId="1849037767" sldId="279"/>
-            <ac:spMk id="5" creationId="{D82A3BF7-0535-4A43-8DAF-81AC5772F649}"/>
-          </ac:spMkLst>
-        </pc:spChg>
-        <pc:spChg chg="add mod">
-          <ac:chgData name="Cynthia Enciso" userId="7915927f-c5cf-4e1f-876d-e79882ad52fa" providerId="ADAL" clId="{ED60EBD3-90AC-49DF-9FC1-4EEE9F91A7A4}" dt="2021-05-11T14:17:22.108" v="129"/>
-          <ac:spMkLst>
-            <pc:docMk/>
-            <pc:sldMk cId="1849037767" sldId="279"/>
-            <ac:spMk id="6" creationId="{1DDAA484-418F-454D-B1D0-FF0E00D671B6}"/>
-          </ac:spMkLst>
-        </pc:spChg>
-        <pc:spChg chg="add mod">
-          <ac:chgData name="Cynthia Enciso" userId="7915927f-c5cf-4e1f-876d-e79882ad52fa" providerId="ADAL" clId="{ED60EBD3-90AC-49DF-9FC1-4EEE9F91A7A4}" dt="2021-05-11T14:17:22.108" v="129"/>
-          <ac:spMkLst>
-            <pc:docMk/>
-            <pc:sldMk cId="1849037767" sldId="279"/>
-            <ac:spMk id="7" creationId="{6B52A878-B9CA-4562-A5E8-EAD991073C43}"/>
-          </ac:spMkLst>
-        </pc:spChg>
-        <pc:spChg chg="add del mod">
-          <ac:chgData name="Cynthia Enciso" userId="7915927f-c5cf-4e1f-876d-e79882ad52fa" providerId="ADAL" clId="{ED60EBD3-90AC-49DF-9FC1-4EEE9F91A7A4}" dt="2021-05-11T14:17:35.325" v="130" actId="478"/>
-          <ac:spMkLst>
-            <pc:docMk/>
-            <pc:sldMk cId="1849037767" sldId="279"/>
-            <ac:spMk id="8" creationId="{4EEEBCD5-56FC-46A2-9626-02DAE31BF8D4}"/>
-          </ac:spMkLst>
-        </pc:spChg>
-        <pc:spChg chg="add del mod">
-          <ac:chgData name="Cynthia Enciso" userId="7915927f-c5cf-4e1f-876d-e79882ad52fa" providerId="ADAL" clId="{ED60EBD3-90AC-49DF-9FC1-4EEE9F91A7A4}" dt="2021-05-11T14:17:35.325" v="130" actId="478"/>
-          <ac:spMkLst>
-            <pc:docMk/>
-            <pc:sldMk cId="1849037767" sldId="279"/>
-            <ac:spMk id="9" creationId="{816DCB65-5A64-495A-8525-7AE1EC0029A7}"/>
-          </ac:spMkLst>
-        </pc:spChg>
-        <pc:spChg chg="add del mod">
-          <ac:chgData name="Cynthia Enciso" userId="7915927f-c5cf-4e1f-876d-e79882ad52fa" providerId="ADAL" clId="{ED60EBD3-90AC-49DF-9FC1-4EEE9F91A7A4}" dt="2021-05-11T14:17:35.325" v="130" actId="478"/>
-          <ac:spMkLst>
-            <pc:docMk/>
-            <pc:sldMk cId="1849037767" sldId="279"/>
-            <ac:spMk id="10" creationId="{EE02DE05-6102-414C-A54C-45698FF5C62E}"/>
-          </ac:spMkLst>
-        </pc:spChg>
-        <pc:spChg chg="add del mod">
-          <ac:chgData name="Cynthia Enciso" userId="7915927f-c5cf-4e1f-876d-e79882ad52fa" providerId="ADAL" clId="{ED60EBD3-90AC-49DF-9FC1-4EEE9F91A7A4}" dt="2021-05-11T14:17:35.325" v="130" actId="478"/>
-          <ac:spMkLst>
-            <pc:docMk/>
-            <pc:sldMk cId="1849037767" sldId="279"/>
-            <ac:spMk id="11" creationId="{CF032A19-1C10-4C73-9186-2838C6C4BE3D}"/>
-          </ac:spMkLst>
-        </pc:spChg>
-        <pc:spChg chg="add del mod">
-          <ac:chgData name="Cynthia Enciso" userId="7915927f-c5cf-4e1f-876d-e79882ad52fa" providerId="ADAL" clId="{ED60EBD3-90AC-49DF-9FC1-4EEE9F91A7A4}" dt="2021-05-11T14:17:35.325" v="130" actId="478"/>
-          <ac:spMkLst>
-            <pc:docMk/>
-            <pc:sldMk cId="1849037767" sldId="279"/>
-            <ac:spMk id="12" creationId="{AED96DB5-59BB-4B28-9EF1-BD7BA7C5C6B1}"/>
-          </ac:spMkLst>
-        </pc:spChg>
-        <pc:spChg chg="add del mod">
-          <ac:chgData name="Cynthia Enciso" userId="7915927f-c5cf-4e1f-876d-e79882ad52fa" providerId="ADAL" clId="{ED60EBD3-90AC-49DF-9FC1-4EEE9F91A7A4}" dt="2021-05-11T14:17:35.325" v="130" actId="478"/>
-          <ac:spMkLst>
-            <pc:docMk/>
-            <pc:sldMk cId="1849037767" sldId="279"/>
-            <ac:spMk id="13" creationId="{BB3C5705-B3ED-4C21-8CE6-A02DF9FAACAF}"/>
-          </ac:spMkLst>
-        </pc:spChg>
-        <pc:cxnChg chg="add del mod">
-          <ac:chgData name="Cynthia Enciso" userId="7915927f-c5cf-4e1f-876d-e79882ad52fa" providerId="ADAL" clId="{ED60EBD3-90AC-49DF-9FC1-4EEE9F91A7A4}" dt="2021-05-11T14:17:35.325" v="130" actId="478"/>
-          <ac:cxnSpMkLst>
-            <pc:docMk/>
-            <pc:sldMk cId="1849037767" sldId="279"/>
-            <ac:cxnSpMk id="14" creationId="{7AC7D2F9-D07A-475A-98C3-4CE967BC292E}"/>
-          </ac:cxnSpMkLst>
-        </pc:cxnChg>
-        <pc:cxnChg chg="add del mod">
-          <ac:chgData name="Cynthia Enciso" userId="7915927f-c5cf-4e1f-876d-e79882ad52fa" providerId="ADAL" clId="{ED60EBD3-90AC-49DF-9FC1-4EEE9F91A7A4}" dt="2021-05-11T14:17:35.325" v="130" actId="478"/>
-          <ac:cxnSpMkLst>
-            <pc:docMk/>
-            <pc:sldMk cId="1849037767" sldId="279"/>
-            <ac:cxnSpMk id="15" creationId="{D8D617E4-D6AA-4D0D-A505-782E4C4C47E5}"/>
-          </ac:cxnSpMkLst>
-        </pc:cxnChg>
-      </pc:sldChg>
-      <pc:sldChg chg="addSp delSp modSp new mod">
-        <pc:chgData name="Cynthia Enciso" userId="7915927f-c5cf-4e1f-876d-e79882ad52fa" providerId="ADAL" clId="{ED60EBD3-90AC-49DF-9FC1-4EEE9F91A7A4}" dt="2021-05-11T21:22:14.441" v="803" actId="20577"/>
-        <pc:sldMkLst>
-          <pc:docMk/>
-          <pc:sldMk cId="3546549088" sldId="279"/>
-        </pc:sldMkLst>
-        <pc:spChg chg="del">
-          <ac:chgData name="Cynthia Enciso" userId="7915927f-c5cf-4e1f-876d-e79882ad52fa" providerId="ADAL" clId="{ED60EBD3-90AC-49DF-9FC1-4EEE9F91A7A4}" dt="2021-05-11T14:19:00.685" v="133" actId="478"/>
-          <ac:spMkLst>
-            <pc:docMk/>
-            <pc:sldMk cId="3546549088" sldId="279"/>
-            <ac:spMk id="3" creationId="{390A5EF9-B584-4529-A566-F8005DD33846}"/>
-          </ac:spMkLst>
-        </pc:spChg>
-        <pc:spChg chg="add mod">
-          <ac:chgData name="Cynthia Enciso" userId="7915927f-c5cf-4e1f-876d-e79882ad52fa" providerId="ADAL" clId="{ED60EBD3-90AC-49DF-9FC1-4EEE9F91A7A4}" dt="2021-05-11T14:23:03.876" v="275" actId="1076"/>
-          <ac:spMkLst>
-            <pc:docMk/>
-            <pc:sldMk cId="3546549088" sldId="279"/>
-            <ac:spMk id="5" creationId="{D3473C4C-285D-4255-B8C8-103EECD1959B}"/>
-          </ac:spMkLst>
-        </pc:spChg>
-        <pc:spChg chg="add mod">
-          <ac:chgData name="Cynthia Enciso" userId="7915927f-c5cf-4e1f-876d-e79882ad52fa" providerId="ADAL" clId="{ED60EBD3-90AC-49DF-9FC1-4EEE9F91A7A4}" dt="2021-05-11T21:19:43.261" v="801" actId="20578"/>
-          <ac:spMkLst>
-            <pc:docMk/>
-            <pc:sldMk cId="3546549088" sldId="279"/>
-            <ac:spMk id="6" creationId="{69FA37D9-1DC2-45F4-AE5C-95ED6052DBA1}"/>
-          </ac:spMkLst>
-        </pc:spChg>
-        <pc:spChg chg="add mod">
-          <ac:chgData name="Cynthia Enciso" userId="7915927f-c5cf-4e1f-876d-e79882ad52fa" providerId="ADAL" clId="{ED60EBD3-90AC-49DF-9FC1-4EEE9F91A7A4}" dt="2021-05-11T14:50:15.340" v="596" actId="20577"/>
-          <ac:spMkLst>
-            <pc:docMk/>
-            <pc:sldMk cId="3546549088" sldId="279"/>
-            <ac:spMk id="7" creationId="{35CE87E0-2A5E-43C1-AC1C-46EEE6C61513}"/>
-          </ac:spMkLst>
-        </pc:spChg>
-        <pc:spChg chg="add mod">
-          <ac:chgData name="Cynthia Enciso" userId="7915927f-c5cf-4e1f-876d-e79882ad52fa" providerId="ADAL" clId="{ED60EBD3-90AC-49DF-9FC1-4EEE9F91A7A4}" dt="2021-05-11T21:22:14.441" v="803" actId="20577"/>
-          <ac:spMkLst>
-            <pc:docMk/>
-            <pc:sldMk cId="3546549088" sldId="279"/>
-            <ac:spMk id="9" creationId="{713B55F1-7E96-485A-A35D-8A02F7001932}"/>
-          </ac:spMkLst>
-        </pc:spChg>
-        <pc:spChg chg="add mod">
-          <ac:chgData name="Cynthia Enciso" userId="7915927f-c5cf-4e1f-876d-e79882ad52fa" providerId="ADAL" clId="{ED60EBD3-90AC-49DF-9FC1-4EEE9F91A7A4}" dt="2021-05-11T14:23:05.862" v="276" actId="1076"/>
-          <ac:spMkLst>
-            <pc:docMk/>
-            <pc:sldMk cId="3546549088" sldId="279"/>
-            <ac:spMk id="11" creationId="{304A5ECF-1BC2-4E9B-B0F9-DC5D63B3BC8F}"/>
-          </ac:spMkLst>
-        </pc:spChg>
-        <pc:spChg chg="add mod">
-          <ac:chgData name="Cynthia Enciso" userId="7915927f-c5cf-4e1f-876d-e79882ad52fa" providerId="ADAL" clId="{ED60EBD3-90AC-49DF-9FC1-4EEE9F91A7A4}" dt="2021-05-11T21:19:45.813" v="802" actId="1076"/>
-          <ac:spMkLst>
-            <pc:docMk/>
-            <pc:sldMk cId="3546549088" sldId="279"/>
-            <ac:spMk id="12" creationId="{45D8670F-86B7-4EC9-8CDF-65303ECC2EA4}"/>
-          </ac:spMkLst>
-        </pc:spChg>
-        <pc:spChg chg="add del mod">
-          <ac:chgData name="Cynthia Enciso" userId="7915927f-c5cf-4e1f-876d-e79882ad52fa" providerId="ADAL" clId="{ED60EBD3-90AC-49DF-9FC1-4EEE9F91A7A4}" dt="2021-05-11T15:16:11.215" v="622" actId="21"/>
-          <ac:spMkLst>
-            <pc:docMk/>
-            <pc:sldMk cId="3546549088" sldId="279"/>
-            <ac:spMk id="13" creationId="{D4FEBEFC-844F-464E-98DF-E634CB78F41A}"/>
-          </ac:spMkLst>
-        </pc:spChg>
-      </pc:sldChg>
-      <pc:sldChg chg="addSp delSp modSp new del mod">
-        <pc:chgData name="Cynthia Enciso" userId="7915927f-c5cf-4e1f-876d-e79882ad52fa" providerId="ADAL" clId="{ED60EBD3-90AC-49DF-9FC1-4EEE9F91A7A4}" dt="2021-05-11T14:49:47.256" v="594" actId="47"/>
-        <pc:sldMkLst>
-          <pc:docMk/>
-          <pc:sldMk cId="1701855086" sldId="280"/>
-        </pc:sldMkLst>
-        <pc:spChg chg="del">
-          <ac:chgData name="Cynthia Enciso" userId="7915927f-c5cf-4e1f-876d-e79882ad52fa" providerId="ADAL" clId="{ED60EBD3-90AC-49DF-9FC1-4EEE9F91A7A4}" dt="2021-05-11T14:27:22.426" v="309" actId="478"/>
-          <ac:spMkLst>
-            <pc:docMk/>
-            <pc:sldMk cId="1701855086" sldId="280"/>
-            <ac:spMk id="3" creationId="{59DEC80E-3EB3-451C-811F-BC970919FB6B}"/>
-          </ac:spMkLst>
-        </pc:spChg>
-        <pc:spChg chg="add mod">
-          <ac:chgData name="Cynthia Enciso" userId="7915927f-c5cf-4e1f-876d-e79882ad52fa" providerId="ADAL" clId="{ED60EBD3-90AC-49DF-9FC1-4EEE9F91A7A4}" dt="2021-05-11T14:35:33.802" v="570" actId="14100"/>
-          <ac:spMkLst>
-            <pc:docMk/>
-            <pc:sldMk cId="1701855086" sldId="280"/>
-            <ac:spMk id="5" creationId="{C1AF383A-9424-43F8-8C4D-369C748DC9A6}"/>
-          </ac:spMkLst>
-        </pc:spChg>
-        <pc:spChg chg="add mod">
-          <ac:chgData name="Cynthia Enciso" userId="7915927f-c5cf-4e1f-876d-e79882ad52fa" providerId="ADAL" clId="{ED60EBD3-90AC-49DF-9FC1-4EEE9F91A7A4}" dt="2021-05-11T14:35:33.802" v="570" actId="14100"/>
-          <ac:spMkLst>
-            <pc:docMk/>
-            <pc:sldMk cId="1701855086" sldId="280"/>
-            <ac:spMk id="6" creationId="{E0BC7619-A425-4A92-B339-4FC362C7C9EF}"/>
-          </ac:spMkLst>
-        </pc:spChg>
-        <pc:spChg chg="add del mod">
-          <ac:chgData name="Cynthia Enciso" userId="7915927f-c5cf-4e1f-876d-e79882ad52fa" providerId="ADAL" clId="{ED60EBD3-90AC-49DF-9FC1-4EEE9F91A7A4}" dt="2021-05-11T14:33:49.518" v="515" actId="478"/>
-          <ac:spMkLst>
-            <pc:docMk/>
-            <pc:sldMk cId="1701855086" sldId="280"/>
-            <ac:spMk id="7" creationId="{64764DB5-DA90-4454-BFF4-4BFE4104A2B7}"/>
-          </ac:spMkLst>
-        </pc:spChg>
-        <pc:spChg chg="add del mod topLvl">
-          <ac:chgData name="Cynthia Enciso" userId="7915927f-c5cf-4e1f-876d-e79882ad52fa" providerId="ADAL" clId="{ED60EBD3-90AC-49DF-9FC1-4EEE9F91A7A4}" dt="2021-05-11T14:49:45.645" v="593" actId="478"/>
-          <ac:spMkLst>
-            <pc:docMk/>
-            <pc:sldMk cId="1701855086" sldId="280"/>
-            <ac:spMk id="8" creationId="{54059B98-7A9B-4575-915F-F8803862DB82}"/>
-          </ac:spMkLst>
-        </pc:spChg>
-        <pc:spChg chg="add del mod topLvl">
-          <ac:chgData name="Cynthia Enciso" userId="7915927f-c5cf-4e1f-876d-e79882ad52fa" providerId="ADAL" clId="{ED60EBD3-90AC-49DF-9FC1-4EEE9F91A7A4}" dt="2021-05-11T14:36:00.842" v="575" actId="478"/>
-          <ac:spMkLst>
-            <pc:docMk/>
-            <pc:sldMk cId="1701855086" sldId="280"/>
-            <ac:spMk id="9" creationId="{1CA03CE3-B2F3-4F91-839D-385E7644E4DD}"/>
-          </ac:spMkLst>
-        </pc:spChg>
-        <pc:spChg chg="mod">
-          <ac:chgData name="Cynthia Enciso" userId="7915927f-c5cf-4e1f-876d-e79882ad52fa" providerId="ADAL" clId="{ED60EBD3-90AC-49DF-9FC1-4EEE9F91A7A4}" dt="2021-05-11T14:34:49.584" v="536" actId="571"/>
-          <ac:spMkLst>
-            <pc:docMk/>
-            <pc:sldMk cId="1701855086" sldId="280"/>
-            <ac:spMk id="13" creationId="{B9D27E03-B12D-4AE9-91CF-CC0A2A98A719}"/>
-          </ac:spMkLst>
-        </pc:spChg>
-        <pc:spChg chg="mod">
-          <ac:chgData name="Cynthia Enciso" userId="7915927f-c5cf-4e1f-876d-e79882ad52fa" providerId="ADAL" clId="{ED60EBD3-90AC-49DF-9FC1-4EEE9F91A7A4}" dt="2021-05-11T14:34:49.584" v="536" actId="571"/>
-          <ac:spMkLst>
-            <pc:docMk/>
-            <pc:sldMk cId="1701855086" sldId="280"/>
-            <ac:spMk id="14" creationId="{0D365DC7-2F2F-423B-8105-807AE13EC8E3}"/>
-          </ac:spMkLst>
-        </pc:spChg>
-        <pc:spChg chg="add mod">
-          <ac:chgData name="Cynthia Enciso" userId="7915927f-c5cf-4e1f-876d-e79882ad52fa" providerId="ADAL" clId="{ED60EBD3-90AC-49DF-9FC1-4EEE9F91A7A4}" dt="2021-05-11T14:36:30.787" v="589" actId="1076"/>
-          <ac:spMkLst>
-            <pc:docMk/>
-            <pc:sldMk cId="1701855086" sldId="280"/>
-            <ac:spMk id="15" creationId="{E6A96F14-8E88-4926-9D7A-E3A25F1887EC}"/>
-          </ac:spMkLst>
-        </pc:spChg>
-        <pc:grpChg chg="add del mod">
-          <ac:chgData name="Cynthia Enciso" userId="7915927f-c5cf-4e1f-876d-e79882ad52fa" providerId="ADAL" clId="{ED60EBD3-90AC-49DF-9FC1-4EEE9F91A7A4}" dt="2021-05-11T14:34:34.449" v="529" actId="165"/>
-          <ac:grpSpMkLst>
-            <pc:docMk/>
-            <pc:sldMk cId="1701855086" sldId="280"/>
-            <ac:grpSpMk id="10" creationId="{EE169C50-F455-4BF2-8E9D-3C739535E63D}"/>
-          </ac:grpSpMkLst>
-        </pc:grpChg>
-        <pc:grpChg chg="add del mod">
-          <ac:chgData name="Cynthia Enciso" userId="7915927f-c5cf-4e1f-876d-e79882ad52fa" providerId="ADAL" clId="{ED60EBD3-90AC-49DF-9FC1-4EEE9F91A7A4}" dt="2021-05-11T14:35:58.010" v="574" actId="165"/>
-          <ac:grpSpMkLst>
-            <pc:docMk/>
-            <pc:sldMk cId="1701855086" sldId="280"/>
-            <ac:grpSpMk id="11" creationId="{CCA5A781-A4B4-407F-AE9B-794BE57F2B14}"/>
-          </ac:grpSpMkLst>
-        </pc:grpChg>
-        <pc:grpChg chg="add mod">
-          <ac:chgData name="Cynthia Enciso" userId="7915927f-c5cf-4e1f-876d-e79882ad52fa" providerId="ADAL" clId="{ED60EBD3-90AC-49DF-9FC1-4EEE9F91A7A4}" dt="2021-05-11T14:34:49.584" v="536" actId="571"/>
-          <ac:grpSpMkLst>
-            <pc:docMk/>
-            <pc:sldMk cId="1701855086" sldId="280"/>
-            <ac:grpSpMk id="12" creationId="{11874C69-A657-4C86-BB89-A82F8EA5DFBE}"/>
-          </ac:grpSpMkLst>
-        </pc:grpChg>
       </pc:sldChg>
     </pc:docChg>
   </pc:docChgLst>
@@ -34640,7 +34640,7 @@
         <p:spPr>
           <a:xfrm>
             <a:off x="159572" y="4711577"/>
-            <a:ext cx="8824856" cy="2462213"/>
+            <a:ext cx="8824856" cy="2031325"/>
           </a:xfrm>
           <a:prstGeom prst="rect">
             <a:avLst/>
@@ -34790,17 +34790,7 @@
               <a:rPr lang="en-US" dirty="0"/>
               <a:t>();</a:t>
             </a:r>
-          </a:p>
-          <a:p>
             <a:endParaRPr lang="en-US" b="1" dirty="0"/>
-          </a:p>
-          <a:p>
-            <a:endParaRPr lang="en-US" sz="1400" b="1" dirty="0">
-              <a:latin typeface="+mj-lt"/>
-              <a:ea typeface="Courier New"/>
-              <a:cs typeface="Courier New"/>
-              <a:sym typeface="Courier New"/>
-            </a:endParaRPr>
           </a:p>
         </p:txBody>
       </p:sp>
@@ -42327,8 +42317,8 @@
         </p:nvSpPr>
         <p:spPr>
           <a:xfrm>
-            <a:off x="106267" y="5463034"/>
-            <a:ext cx="7935186" cy="1815882"/>
+            <a:off x="71716" y="5365415"/>
+            <a:ext cx="7895110" cy="1384995"/>
           </a:xfrm>
           <a:prstGeom prst="rect">
             <a:avLst/>
@@ -42369,12 +42359,6 @@
               <a:rPr lang="en-US" b="1" dirty="0"/>
               <a:t>// the dog2 reference variable can access bark() only (click on the reference variable!)</a:t>
             </a:r>
-          </a:p>
-          <a:p>
-            <a:endParaRPr lang="en-US" b="1" dirty="0"/>
-          </a:p>
-          <a:p>
-            <a:endParaRPr lang="en-US" b="1" dirty="0"/>
           </a:p>
         </p:txBody>
       </p:sp>

</xml_diff>